<commit_message>
Tom updated markers files
</commit_message>
<xml_diff>
--- a/markers.pptx
+++ b/markers.pptx
@@ -1,6 +1,6 @@
 
 <file path=ppt/presentation.xml><?xml version="1.0" encoding="utf-8"?>
-<p:presentation xmlns:a="http://schemas.openxmlformats.org/drawingml/2006/main" xmlns:r="http://schemas.openxmlformats.org/officeDocument/2006/relationships" xmlns:p="http://schemas.openxmlformats.org/presentationml/2006/main" rtl="1" saveSubsetFonts="1">
+<p:presentation xmlns:a="http://schemas.openxmlformats.org/drawingml/2006/main" xmlns:r="http://schemas.openxmlformats.org/officeDocument/2006/relationships" xmlns:p="http://schemas.openxmlformats.org/presentationml/2006/main" saveSubsetFonts="1">
   <p:sldMasterIdLst>
     <p:sldMasterId id="2147483648" r:id="rId1"/>
   </p:sldMasterIdLst>
@@ -9,14 +9,26 @@
     <p:sldId id="257" r:id="rId3"/>
     <p:sldId id="258" r:id="rId4"/>
     <p:sldId id="259" r:id="rId5"/>
+    <p:sldId id="260" r:id="rId6"/>
+    <p:sldId id="261" r:id="rId7"/>
+    <p:sldId id="262" r:id="rId8"/>
+    <p:sldId id="263" r:id="rId9"/>
+    <p:sldId id="265" r:id="rId10"/>
+    <p:sldId id="266" r:id="rId11"/>
+    <p:sldId id="267" r:id="rId12"/>
+    <p:sldId id="268" r:id="rId13"/>
+    <p:sldId id="269" r:id="rId14"/>
+    <p:sldId id="270" r:id="rId15"/>
+    <p:sldId id="271" r:id="rId16"/>
+    <p:sldId id="264" r:id="rId17"/>
   </p:sldIdLst>
-  <p:sldSz cx="9144000" cy="6858000" type="screen4x3"/>
-  <p:notesSz cx="6858000" cy="9144000"/>
+  <p:sldSz cx="6858000" cy="9144000" type="screen4x3"/>
+  <p:notesSz cx="6797675" cy="9926638"/>
   <p:defaultTextStyle>
     <a:defPPr>
-      <a:defRPr lang="he-IL"/>
+      <a:defRPr lang="en-US"/>
     </a:defPPr>
-    <a:lvl1pPr marL="0" algn="r" defTabSz="914400" rtl="1" eaLnBrk="1" latinLnBrk="0" hangingPunct="1">
+    <a:lvl1pPr marL="0" algn="l" defTabSz="914400" rtl="0" eaLnBrk="1" latinLnBrk="0" hangingPunct="1">
       <a:defRPr sz="1800" kern="1200">
         <a:solidFill>
           <a:schemeClr val="tx1"/>
@@ -26,7 +38,7 @@
         <a:cs typeface="+mn-cs"/>
       </a:defRPr>
     </a:lvl1pPr>
-    <a:lvl2pPr marL="457200" algn="r" defTabSz="914400" rtl="1" eaLnBrk="1" latinLnBrk="0" hangingPunct="1">
+    <a:lvl2pPr marL="457200" algn="l" defTabSz="914400" rtl="0" eaLnBrk="1" latinLnBrk="0" hangingPunct="1">
       <a:defRPr sz="1800" kern="1200">
         <a:solidFill>
           <a:schemeClr val="tx1"/>
@@ -36,7 +48,7 @@
         <a:cs typeface="+mn-cs"/>
       </a:defRPr>
     </a:lvl2pPr>
-    <a:lvl3pPr marL="914400" algn="r" defTabSz="914400" rtl="1" eaLnBrk="1" latinLnBrk="0" hangingPunct="1">
+    <a:lvl3pPr marL="914400" algn="l" defTabSz="914400" rtl="0" eaLnBrk="1" latinLnBrk="0" hangingPunct="1">
       <a:defRPr sz="1800" kern="1200">
         <a:solidFill>
           <a:schemeClr val="tx1"/>
@@ -46,7 +58,7 @@
         <a:cs typeface="+mn-cs"/>
       </a:defRPr>
     </a:lvl3pPr>
-    <a:lvl4pPr marL="1371600" algn="r" defTabSz="914400" rtl="1" eaLnBrk="1" latinLnBrk="0" hangingPunct="1">
+    <a:lvl4pPr marL="1371600" algn="l" defTabSz="914400" rtl="0" eaLnBrk="1" latinLnBrk="0" hangingPunct="1">
       <a:defRPr sz="1800" kern="1200">
         <a:solidFill>
           <a:schemeClr val="tx1"/>
@@ -56,7 +68,7 @@
         <a:cs typeface="+mn-cs"/>
       </a:defRPr>
     </a:lvl4pPr>
-    <a:lvl5pPr marL="1828800" algn="r" defTabSz="914400" rtl="1" eaLnBrk="1" latinLnBrk="0" hangingPunct="1">
+    <a:lvl5pPr marL="1828800" algn="l" defTabSz="914400" rtl="0" eaLnBrk="1" latinLnBrk="0" hangingPunct="1">
       <a:defRPr sz="1800" kern="1200">
         <a:solidFill>
           <a:schemeClr val="tx1"/>
@@ -66,7 +78,7 @@
         <a:cs typeface="+mn-cs"/>
       </a:defRPr>
     </a:lvl5pPr>
-    <a:lvl6pPr marL="2286000" algn="r" defTabSz="914400" rtl="1" eaLnBrk="1" latinLnBrk="0" hangingPunct="1">
+    <a:lvl6pPr marL="2286000" algn="l" defTabSz="914400" rtl="0" eaLnBrk="1" latinLnBrk="0" hangingPunct="1">
       <a:defRPr sz="1800" kern="1200">
         <a:solidFill>
           <a:schemeClr val="tx1"/>
@@ -76,7 +88,7 @@
         <a:cs typeface="+mn-cs"/>
       </a:defRPr>
     </a:lvl6pPr>
-    <a:lvl7pPr marL="2743200" algn="r" defTabSz="914400" rtl="1" eaLnBrk="1" latinLnBrk="0" hangingPunct="1">
+    <a:lvl7pPr marL="2743200" algn="l" defTabSz="914400" rtl="0" eaLnBrk="1" latinLnBrk="0" hangingPunct="1">
       <a:defRPr sz="1800" kern="1200">
         <a:solidFill>
           <a:schemeClr val="tx1"/>
@@ -86,7 +98,7 @@
         <a:cs typeface="+mn-cs"/>
       </a:defRPr>
     </a:lvl7pPr>
-    <a:lvl8pPr marL="3200400" algn="r" defTabSz="914400" rtl="1" eaLnBrk="1" latinLnBrk="0" hangingPunct="1">
+    <a:lvl8pPr marL="3200400" algn="l" defTabSz="914400" rtl="0" eaLnBrk="1" latinLnBrk="0" hangingPunct="1">
       <a:defRPr sz="1800" kern="1200">
         <a:solidFill>
           <a:schemeClr val="tx1"/>
@@ -96,7 +108,7 @@
         <a:cs typeface="+mn-cs"/>
       </a:defRPr>
     </a:lvl8pPr>
-    <a:lvl9pPr marL="3657600" algn="r" defTabSz="914400" rtl="1" eaLnBrk="1" latinLnBrk="0" hangingPunct="1">
+    <a:lvl9pPr marL="3657600" algn="l" defTabSz="914400" rtl="0" eaLnBrk="1" latinLnBrk="0" hangingPunct="1">
       <a:defRPr sz="1800" kern="1200">
         <a:solidFill>
           <a:schemeClr val="tx1"/>
@@ -139,8 +151,8 @@
         </p:nvSpPr>
         <p:spPr>
           <a:xfrm>
-            <a:off x="685800" y="2130425"/>
-            <a:ext cx="7772400" cy="1470025"/>
+            <a:off x="514350" y="2840568"/>
+            <a:ext cx="5829300" cy="1960033"/>
           </a:xfrm>
         </p:spPr>
         <p:txBody>
@@ -151,7 +163,7 @@
               <a:rPr lang="en-US" smtClean="0"/>
               <a:t>Click to edit Master title style</a:t>
             </a:r>
-            <a:endParaRPr lang="he-IL"/>
+            <a:endParaRPr lang="en-US"/>
           </a:p>
         </p:txBody>
       </p:sp>
@@ -167,8 +179,8 @@
         </p:nvSpPr>
         <p:spPr>
           <a:xfrm>
-            <a:off x="1371600" y="3886200"/>
-            <a:ext cx="6400800" cy="1752600"/>
+            <a:off x="1028700" y="5181600"/>
+            <a:ext cx="4800600" cy="2336800"/>
           </a:xfrm>
         </p:spPr>
         <p:txBody>
@@ -270,7 +282,7 @@
               <a:rPr lang="en-US" smtClean="0"/>
               <a:t>Click to edit Master subtitle style</a:t>
             </a:r>
-            <a:endParaRPr lang="he-IL"/>
+            <a:endParaRPr lang="en-US"/>
           </a:p>
         </p:txBody>
       </p:sp>
@@ -289,11 +301,11 @@
           <a:bodyPr/>
           <a:lstStyle/>
           <a:p>
-            <a:fld id="{A82557F8-C590-4812-81B0-0D1326F3AC0C}" type="datetimeFigureOut">
-              <a:rPr lang="he-IL" smtClean="0"/>
-              <a:t>ג'/אייר/תשע"ב</a:t>
+            <a:fld id="{402794DC-014F-427E-AFF1-CD343D3BB4A7}" type="datetimeFigureOut">
+              <a:rPr lang="en-US" smtClean="0"/>
+              <a:t>4/30/2012</a:t>
             </a:fld>
-            <a:endParaRPr lang="he-IL"/>
+            <a:endParaRPr lang="en-US"/>
           </a:p>
         </p:txBody>
       </p:sp>
@@ -312,7 +324,7 @@
           <a:bodyPr/>
           <a:lstStyle/>
           <a:p>
-            <a:endParaRPr lang="he-IL"/>
+            <a:endParaRPr lang="en-US"/>
           </a:p>
         </p:txBody>
       </p:sp>
@@ -331,15 +343,20 @@
           <a:bodyPr/>
           <a:lstStyle/>
           <a:p>
-            <a:fld id="{E2414829-E055-48A8-B3F9-33C5147C1A36}" type="slidenum">
-              <a:rPr lang="he-IL" smtClean="0"/>
+            <a:fld id="{A2AD3433-B990-4A9D-B3C5-8349BA3332EE}" type="slidenum">
+              <a:rPr lang="en-US" smtClean="0"/>
               <a:t>‹#›</a:t>
             </a:fld>
-            <a:endParaRPr lang="he-IL"/>
+            <a:endParaRPr lang="en-US"/>
           </a:p>
         </p:txBody>
       </p:sp>
     </p:spTree>
+    <p:extLst>
+      <p:ext uri="{BB962C8B-B14F-4D97-AF65-F5344CB8AC3E}">
+        <p14:creationId xmlns:p14="http://schemas.microsoft.com/office/powerpoint/2010/main" val="2703839813"/>
+      </p:ext>
+    </p:extLst>
   </p:cSld>
   <p:clrMapOvr>
     <a:masterClrMapping/>
@@ -383,7 +400,7 @@
               <a:rPr lang="en-US" smtClean="0"/>
               <a:t>Click to edit Master title style</a:t>
             </a:r>
-            <a:endParaRPr lang="he-IL"/>
+            <a:endParaRPr lang="en-US"/>
           </a:p>
         </p:txBody>
       </p:sp>
@@ -435,7 +452,7 @@
               <a:rPr lang="en-US" smtClean="0"/>
               <a:t>Fifth level</a:t>
             </a:r>
-            <a:endParaRPr lang="he-IL"/>
+            <a:endParaRPr lang="en-US"/>
           </a:p>
         </p:txBody>
       </p:sp>
@@ -454,11 +471,11 @@
           <a:bodyPr/>
           <a:lstStyle/>
           <a:p>
-            <a:fld id="{A82557F8-C590-4812-81B0-0D1326F3AC0C}" type="datetimeFigureOut">
-              <a:rPr lang="he-IL" smtClean="0"/>
-              <a:t>ג'/אייר/תשע"ב</a:t>
+            <a:fld id="{402794DC-014F-427E-AFF1-CD343D3BB4A7}" type="datetimeFigureOut">
+              <a:rPr lang="en-US" smtClean="0"/>
+              <a:t>4/30/2012</a:t>
             </a:fld>
-            <a:endParaRPr lang="he-IL"/>
+            <a:endParaRPr lang="en-US"/>
           </a:p>
         </p:txBody>
       </p:sp>
@@ -477,7 +494,7 @@
           <a:bodyPr/>
           <a:lstStyle/>
           <a:p>
-            <a:endParaRPr lang="he-IL"/>
+            <a:endParaRPr lang="en-US"/>
           </a:p>
         </p:txBody>
       </p:sp>
@@ -496,15 +513,20 @@
           <a:bodyPr/>
           <a:lstStyle/>
           <a:p>
-            <a:fld id="{E2414829-E055-48A8-B3F9-33C5147C1A36}" type="slidenum">
-              <a:rPr lang="he-IL" smtClean="0"/>
+            <a:fld id="{A2AD3433-B990-4A9D-B3C5-8349BA3332EE}" type="slidenum">
+              <a:rPr lang="en-US" smtClean="0"/>
               <a:t>‹#›</a:t>
             </a:fld>
-            <a:endParaRPr lang="he-IL"/>
+            <a:endParaRPr lang="en-US"/>
           </a:p>
         </p:txBody>
       </p:sp>
     </p:spTree>
+    <p:extLst>
+      <p:ext uri="{BB962C8B-B14F-4D97-AF65-F5344CB8AC3E}">
+        <p14:creationId xmlns:p14="http://schemas.microsoft.com/office/powerpoint/2010/main" val="388620642"/>
+      </p:ext>
+    </p:extLst>
   </p:cSld>
   <p:clrMapOvr>
     <a:masterClrMapping/>
@@ -541,8 +563,8 @@
         </p:nvSpPr>
         <p:spPr>
           <a:xfrm>
-            <a:off x="6629400" y="274638"/>
-            <a:ext cx="2057400" cy="5851525"/>
+            <a:off x="3729037" y="488951"/>
+            <a:ext cx="1157288" cy="10401300"/>
           </a:xfrm>
         </p:spPr>
         <p:txBody>
@@ -553,7 +575,7 @@
               <a:rPr lang="en-US" smtClean="0"/>
               <a:t>Click to edit Master title style</a:t>
             </a:r>
-            <a:endParaRPr lang="he-IL"/>
+            <a:endParaRPr lang="en-US"/>
           </a:p>
         </p:txBody>
       </p:sp>
@@ -569,8 +591,8 @@
         </p:nvSpPr>
         <p:spPr>
           <a:xfrm>
-            <a:off x="457200" y="274638"/>
-            <a:ext cx="6019800" cy="5851525"/>
+            <a:off x="257175" y="488951"/>
+            <a:ext cx="3357563" cy="10401300"/>
           </a:xfrm>
         </p:spPr>
         <p:txBody>
@@ -610,7 +632,7 @@
               <a:rPr lang="en-US" smtClean="0"/>
               <a:t>Fifth level</a:t>
             </a:r>
-            <a:endParaRPr lang="he-IL"/>
+            <a:endParaRPr lang="en-US"/>
           </a:p>
         </p:txBody>
       </p:sp>
@@ -629,11 +651,11 @@
           <a:bodyPr/>
           <a:lstStyle/>
           <a:p>
-            <a:fld id="{A82557F8-C590-4812-81B0-0D1326F3AC0C}" type="datetimeFigureOut">
-              <a:rPr lang="he-IL" smtClean="0"/>
-              <a:t>ג'/אייר/תשע"ב</a:t>
+            <a:fld id="{402794DC-014F-427E-AFF1-CD343D3BB4A7}" type="datetimeFigureOut">
+              <a:rPr lang="en-US" smtClean="0"/>
+              <a:t>4/30/2012</a:t>
             </a:fld>
-            <a:endParaRPr lang="he-IL"/>
+            <a:endParaRPr lang="en-US"/>
           </a:p>
         </p:txBody>
       </p:sp>
@@ -652,7 +674,7 @@
           <a:bodyPr/>
           <a:lstStyle/>
           <a:p>
-            <a:endParaRPr lang="he-IL"/>
+            <a:endParaRPr lang="en-US"/>
           </a:p>
         </p:txBody>
       </p:sp>
@@ -671,15 +693,20 @@
           <a:bodyPr/>
           <a:lstStyle/>
           <a:p>
-            <a:fld id="{E2414829-E055-48A8-B3F9-33C5147C1A36}" type="slidenum">
-              <a:rPr lang="he-IL" smtClean="0"/>
+            <a:fld id="{A2AD3433-B990-4A9D-B3C5-8349BA3332EE}" type="slidenum">
+              <a:rPr lang="en-US" smtClean="0"/>
               <a:t>‹#›</a:t>
             </a:fld>
-            <a:endParaRPr lang="he-IL"/>
+            <a:endParaRPr lang="en-US"/>
           </a:p>
         </p:txBody>
       </p:sp>
     </p:spTree>
+    <p:extLst>
+      <p:ext uri="{BB962C8B-B14F-4D97-AF65-F5344CB8AC3E}">
+        <p14:creationId xmlns:p14="http://schemas.microsoft.com/office/powerpoint/2010/main" val="2180091861"/>
+      </p:ext>
+    </p:extLst>
   </p:cSld>
   <p:clrMapOvr>
     <a:masterClrMapping/>
@@ -723,7 +750,7 @@
               <a:rPr lang="en-US" smtClean="0"/>
               <a:t>Click to edit Master title style</a:t>
             </a:r>
-            <a:endParaRPr lang="he-IL"/>
+            <a:endParaRPr lang="en-US"/>
           </a:p>
         </p:txBody>
       </p:sp>
@@ -775,7 +802,7 @@
               <a:rPr lang="en-US" smtClean="0"/>
               <a:t>Fifth level</a:t>
             </a:r>
-            <a:endParaRPr lang="he-IL"/>
+            <a:endParaRPr lang="en-US"/>
           </a:p>
         </p:txBody>
       </p:sp>
@@ -794,11 +821,11 @@
           <a:bodyPr/>
           <a:lstStyle/>
           <a:p>
-            <a:fld id="{A82557F8-C590-4812-81B0-0D1326F3AC0C}" type="datetimeFigureOut">
-              <a:rPr lang="he-IL" smtClean="0"/>
-              <a:t>ג'/אייר/תשע"ב</a:t>
+            <a:fld id="{402794DC-014F-427E-AFF1-CD343D3BB4A7}" type="datetimeFigureOut">
+              <a:rPr lang="en-US" smtClean="0"/>
+              <a:t>4/30/2012</a:t>
             </a:fld>
-            <a:endParaRPr lang="he-IL"/>
+            <a:endParaRPr lang="en-US"/>
           </a:p>
         </p:txBody>
       </p:sp>
@@ -817,7 +844,7 @@
           <a:bodyPr/>
           <a:lstStyle/>
           <a:p>
-            <a:endParaRPr lang="he-IL"/>
+            <a:endParaRPr lang="en-US"/>
           </a:p>
         </p:txBody>
       </p:sp>
@@ -836,15 +863,20 @@
           <a:bodyPr/>
           <a:lstStyle/>
           <a:p>
-            <a:fld id="{E2414829-E055-48A8-B3F9-33C5147C1A36}" type="slidenum">
-              <a:rPr lang="he-IL" smtClean="0"/>
+            <a:fld id="{A2AD3433-B990-4A9D-B3C5-8349BA3332EE}" type="slidenum">
+              <a:rPr lang="en-US" smtClean="0"/>
               <a:t>‹#›</a:t>
             </a:fld>
-            <a:endParaRPr lang="he-IL"/>
+            <a:endParaRPr lang="en-US"/>
           </a:p>
         </p:txBody>
       </p:sp>
     </p:spTree>
+    <p:extLst>
+      <p:ext uri="{BB962C8B-B14F-4D97-AF65-F5344CB8AC3E}">
+        <p14:creationId xmlns:p14="http://schemas.microsoft.com/office/powerpoint/2010/main" val="3679703971"/>
+      </p:ext>
+    </p:extLst>
   </p:cSld>
   <p:clrMapOvr>
     <a:masterClrMapping/>
@@ -881,14 +913,14 @@
         </p:nvSpPr>
         <p:spPr>
           <a:xfrm>
-            <a:off x="722313" y="4406900"/>
-            <a:ext cx="7772400" cy="1362075"/>
+            <a:off x="541735" y="5875867"/>
+            <a:ext cx="5829300" cy="1816100"/>
           </a:xfrm>
         </p:spPr>
         <p:txBody>
           <a:bodyPr anchor="t"/>
           <a:lstStyle>
-            <a:lvl1pPr algn="r">
+            <a:lvl1pPr algn="l">
               <a:defRPr sz="4000" b="1" cap="all"/>
             </a:lvl1pPr>
           </a:lstStyle>
@@ -897,7 +929,7 @@
               <a:rPr lang="en-US" smtClean="0"/>
               <a:t>Click to edit Master title style</a:t>
             </a:r>
-            <a:endParaRPr lang="he-IL"/>
+            <a:endParaRPr lang="en-US"/>
           </a:p>
         </p:txBody>
       </p:sp>
@@ -913,8 +945,8 @@
         </p:nvSpPr>
         <p:spPr>
           <a:xfrm>
-            <a:off x="722313" y="2906713"/>
-            <a:ext cx="7772400" cy="1500187"/>
+            <a:off x="541735" y="3875618"/>
+            <a:ext cx="5829300" cy="2000249"/>
           </a:xfrm>
         </p:spPr>
         <p:txBody>
@@ -1035,11 +1067,11 @@
           <a:bodyPr/>
           <a:lstStyle/>
           <a:p>
-            <a:fld id="{A82557F8-C590-4812-81B0-0D1326F3AC0C}" type="datetimeFigureOut">
-              <a:rPr lang="he-IL" smtClean="0"/>
-              <a:t>ג'/אייר/תשע"ב</a:t>
+            <a:fld id="{402794DC-014F-427E-AFF1-CD343D3BB4A7}" type="datetimeFigureOut">
+              <a:rPr lang="en-US" smtClean="0"/>
+              <a:t>4/30/2012</a:t>
             </a:fld>
-            <a:endParaRPr lang="he-IL"/>
+            <a:endParaRPr lang="en-US"/>
           </a:p>
         </p:txBody>
       </p:sp>
@@ -1058,7 +1090,7 @@
           <a:bodyPr/>
           <a:lstStyle/>
           <a:p>
-            <a:endParaRPr lang="he-IL"/>
+            <a:endParaRPr lang="en-US"/>
           </a:p>
         </p:txBody>
       </p:sp>
@@ -1077,15 +1109,20 @@
           <a:bodyPr/>
           <a:lstStyle/>
           <a:p>
-            <a:fld id="{E2414829-E055-48A8-B3F9-33C5147C1A36}" type="slidenum">
-              <a:rPr lang="he-IL" smtClean="0"/>
+            <a:fld id="{A2AD3433-B990-4A9D-B3C5-8349BA3332EE}" type="slidenum">
+              <a:rPr lang="en-US" smtClean="0"/>
               <a:t>‹#›</a:t>
             </a:fld>
-            <a:endParaRPr lang="he-IL"/>
+            <a:endParaRPr lang="en-US"/>
           </a:p>
         </p:txBody>
       </p:sp>
     </p:spTree>
+    <p:extLst>
+      <p:ext uri="{BB962C8B-B14F-4D97-AF65-F5344CB8AC3E}">
+        <p14:creationId xmlns:p14="http://schemas.microsoft.com/office/powerpoint/2010/main" val="3031628375"/>
+      </p:ext>
+    </p:extLst>
   </p:cSld>
   <p:clrMapOvr>
     <a:masterClrMapping/>
@@ -1129,7 +1166,7 @@
               <a:rPr lang="en-US" smtClean="0"/>
               <a:t>Click to edit Master title style</a:t>
             </a:r>
-            <a:endParaRPr lang="he-IL"/>
+            <a:endParaRPr lang="en-US"/>
           </a:p>
         </p:txBody>
       </p:sp>
@@ -1145,8 +1182,8 @@
         </p:nvSpPr>
         <p:spPr>
           <a:xfrm>
-            <a:off x="457200" y="1600200"/>
-            <a:ext cx="4038600" cy="4525963"/>
+            <a:off x="257175" y="2844800"/>
+            <a:ext cx="2257425" cy="8045451"/>
           </a:xfrm>
         </p:spPr>
         <p:txBody>
@@ -1214,7 +1251,7 @@
               <a:rPr lang="en-US" smtClean="0"/>
               <a:t>Fifth level</a:t>
             </a:r>
-            <a:endParaRPr lang="he-IL"/>
+            <a:endParaRPr lang="en-US"/>
           </a:p>
         </p:txBody>
       </p:sp>
@@ -1230,8 +1267,8 @@
         </p:nvSpPr>
         <p:spPr>
           <a:xfrm>
-            <a:off x="4648200" y="1600200"/>
-            <a:ext cx="4038600" cy="4525963"/>
+            <a:off x="2628900" y="2844800"/>
+            <a:ext cx="2257425" cy="8045451"/>
           </a:xfrm>
         </p:spPr>
         <p:txBody>
@@ -1299,7 +1336,7 @@
               <a:rPr lang="en-US" smtClean="0"/>
               <a:t>Fifth level</a:t>
             </a:r>
-            <a:endParaRPr lang="he-IL"/>
+            <a:endParaRPr lang="en-US"/>
           </a:p>
         </p:txBody>
       </p:sp>
@@ -1318,11 +1355,11 @@
           <a:bodyPr/>
           <a:lstStyle/>
           <a:p>
-            <a:fld id="{A82557F8-C590-4812-81B0-0D1326F3AC0C}" type="datetimeFigureOut">
-              <a:rPr lang="he-IL" smtClean="0"/>
-              <a:t>ג'/אייר/תשע"ב</a:t>
+            <a:fld id="{402794DC-014F-427E-AFF1-CD343D3BB4A7}" type="datetimeFigureOut">
+              <a:rPr lang="en-US" smtClean="0"/>
+              <a:t>4/30/2012</a:t>
             </a:fld>
-            <a:endParaRPr lang="he-IL"/>
+            <a:endParaRPr lang="en-US"/>
           </a:p>
         </p:txBody>
       </p:sp>
@@ -1341,7 +1378,7 @@
           <a:bodyPr/>
           <a:lstStyle/>
           <a:p>
-            <a:endParaRPr lang="he-IL"/>
+            <a:endParaRPr lang="en-US"/>
           </a:p>
         </p:txBody>
       </p:sp>
@@ -1360,15 +1397,20 @@
           <a:bodyPr/>
           <a:lstStyle/>
           <a:p>
-            <a:fld id="{E2414829-E055-48A8-B3F9-33C5147C1A36}" type="slidenum">
-              <a:rPr lang="he-IL" smtClean="0"/>
+            <a:fld id="{A2AD3433-B990-4A9D-B3C5-8349BA3332EE}" type="slidenum">
+              <a:rPr lang="en-US" smtClean="0"/>
               <a:t>‹#›</a:t>
             </a:fld>
-            <a:endParaRPr lang="he-IL"/>
+            <a:endParaRPr lang="en-US"/>
           </a:p>
         </p:txBody>
       </p:sp>
     </p:spTree>
+    <p:extLst>
+      <p:ext uri="{BB962C8B-B14F-4D97-AF65-F5344CB8AC3E}">
+        <p14:creationId xmlns:p14="http://schemas.microsoft.com/office/powerpoint/2010/main" val="1466592313"/>
+      </p:ext>
+    </p:extLst>
   </p:cSld>
   <p:clrMapOvr>
     <a:masterClrMapping/>
@@ -1403,7 +1445,12 @@
             <p:ph type="title"/>
           </p:nvPr>
         </p:nvSpPr>
-        <p:spPr/>
+        <p:spPr>
+          <a:xfrm>
+            <a:off x="342900" y="366184"/>
+            <a:ext cx="6172200" cy="1524000"/>
+          </a:xfrm>
+        </p:spPr>
         <p:txBody>
           <a:bodyPr/>
           <a:lstStyle>
@@ -1416,7 +1463,7 @@
               <a:rPr lang="en-US" smtClean="0"/>
               <a:t>Click to edit Master title style</a:t>
             </a:r>
-            <a:endParaRPr lang="he-IL"/>
+            <a:endParaRPr lang="en-US"/>
           </a:p>
         </p:txBody>
       </p:sp>
@@ -1432,8 +1479,8 @@
         </p:nvSpPr>
         <p:spPr>
           <a:xfrm>
-            <a:off x="457200" y="1535113"/>
-            <a:ext cx="4040188" cy="639762"/>
+            <a:off x="342900" y="2046817"/>
+            <a:ext cx="3030141" cy="853016"/>
           </a:xfrm>
         </p:spPr>
         <p:txBody>
@@ -1497,8 +1544,8 @@
         </p:nvSpPr>
         <p:spPr>
           <a:xfrm>
-            <a:off x="457200" y="2174875"/>
-            <a:ext cx="4040188" cy="3951288"/>
+            <a:off x="342900" y="2899833"/>
+            <a:ext cx="3030141" cy="5268384"/>
           </a:xfrm>
         </p:spPr>
         <p:txBody>
@@ -1566,7 +1613,7 @@
               <a:rPr lang="en-US" smtClean="0"/>
               <a:t>Fifth level</a:t>
             </a:r>
-            <a:endParaRPr lang="he-IL"/>
+            <a:endParaRPr lang="en-US"/>
           </a:p>
         </p:txBody>
       </p:sp>
@@ -1582,8 +1629,8 @@
         </p:nvSpPr>
         <p:spPr>
           <a:xfrm>
-            <a:off x="4645025" y="1535113"/>
-            <a:ext cx="4041775" cy="639762"/>
+            <a:off x="3483769" y="2046817"/>
+            <a:ext cx="3031331" cy="853016"/>
           </a:xfrm>
         </p:spPr>
         <p:txBody>
@@ -1647,8 +1694,8 @@
         </p:nvSpPr>
         <p:spPr>
           <a:xfrm>
-            <a:off x="4645025" y="2174875"/>
-            <a:ext cx="4041775" cy="3951288"/>
+            <a:off x="3483769" y="2899833"/>
+            <a:ext cx="3031331" cy="5268384"/>
           </a:xfrm>
         </p:spPr>
         <p:txBody>
@@ -1716,7 +1763,7 @@
               <a:rPr lang="en-US" smtClean="0"/>
               <a:t>Fifth level</a:t>
             </a:r>
-            <a:endParaRPr lang="he-IL"/>
+            <a:endParaRPr lang="en-US"/>
           </a:p>
         </p:txBody>
       </p:sp>
@@ -1735,11 +1782,11 @@
           <a:bodyPr/>
           <a:lstStyle/>
           <a:p>
-            <a:fld id="{A82557F8-C590-4812-81B0-0D1326F3AC0C}" type="datetimeFigureOut">
-              <a:rPr lang="he-IL" smtClean="0"/>
-              <a:t>ג'/אייר/תשע"ב</a:t>
+            <a:fld id="{402794DC-014F-427E-AFF1-CD343D3BB4A7}" type="datetimeFigureOut">
+              <a:rPr lang="en-US" smtClean="0"/>
+              <a:t>4/30/2012</a:t>
             </a:fld>
-            <a:endParaRPr lang="he-IL"/>
+            <a:endParaRPr lang="en-US"/>
           </a:p>
         </p:txBody>
       </p:sp>
@@ -1758,7 +1805,7 @@
           <a:bodyPr/>
           <a:lstStyle/>
           <a:p>
-            <a:endParaRPr lang="he-IL"/>
+            <a:endParaRPr lang="en-US"/>
           </a:p>
         </p:txBody>
       </p:sp>
@@ -1777,15 +1824,20 @@
           <a:bodyPr/>
           <a:lstStyle/>
           <a:p>
-            <a:fld id="{E2414829-E055-48A8-B3F9-33C5147C1A36}" type="slidenum">
-              <a:rPr lang="he-IL" smtClean="0"/>
+            <a:fld id="{A2AD3433-B990-4A9D-B3C5-8349BA3332EE}" type="slidenum">
+              <a:rPr lang="en-US" smtClean="0"/>
               <a:t>‹#›</a:t>
             </a:fld>
-            <a:endParaRPr lang="he-IL"/>
+            <a:endParaRPr lang="en-US"/>
           </a:p>
         </p:txBody>
       </p:sp>
     </p:spTree>
+    <p:extLst>
+      <p:ext uri="{BB962C8B-B14F-4D97-AF65-F5344CB8AC3E}">
+        <p14:creationId xmlns:p14="http://schemas.microsoft.com/office/powerpoint/2010/main" val="251110902"/>
+      </p:ext>
+    </p:extLst>
   </p:cSld>
   <p:clrMapOvr>
     <a:masterClrMapping/>
@@ -1829,7 +1881,7 @@
               <a:rPr lang="en-US" smtClean="0"/>
               <a:t>Click to edit Master title style</a:t>
             </a:r>
-            <a:endParaRPr lang="he-IL"/>
+            <a:endParaRPr lang="en-US"/>
           </a:p>
         </p:txBody>
       </p:sp>
@@ -1848,11 +1900,11 @@
           <a:bodyPr/>
           <a:lstStyle/>
           <a:p>
-            <a:fld id="{A82557F8-C590-4812-81B0-0D1326F3AC0C}" type="datetimeFigureOut">
-              <a:rPr lang="he-IL" smtClean="0"/>
-              <a:t>ג'/אייר/תשע"ב</a:t>
+            <a:fld id="{402794DC-014F-427E-AFF1-CD343D3BB4A7}" type="datetimeFigureOut">
+              <a:rPr lang="en-US" smtClean="0"/>
+              <a:t>4/30/2012</a:t>
             </a:fld>
-            <a:endParaRPr lang="he-IL"/>
+            <a:endParaRPr lang="en-US"/>
           </a:p>
         </p:txBody>
       </p:sp>
@@ -1871,7 +1923,7 @@
           <a:bodyPr/>
           <a:lstStyle/>
           <a:p>
-            <a:endParaRPr lang="he-IL"/>
+            <a:endParaRPr lang="en-US"/>
           </a:p>
         </p:txBody>
       </p:sp>
@@ -1890,15 +1942,20 @@
           <a:bodyPr/>
           <a:lstStyle/>
           <a:p>
-            <a:fld id="{E2414829-E055-48A8-B3F9-33C5147C1A36}" type="slidenum">
-              <a:rPr lang="he-IL" smtClean="0"/>
+            <a:fld id="{A2AD3433-B990-4A9D-B3C5-8349BA3332EE}" type="slidenum">
+              <a:rPr lang="en-US" smtClean="0"/>
               <a:t>‹#›</a:t>
             </a:fld>
-            <a:endParaRPr lang="he-IL"/>
+            <a:endParaRPr lang="en-US"/>
           </a:p>
         </p:txBody>
       </p:sp>
     </p:spTree>
+    <p:extLst>
+      <p:ext uri="{BB962C8B-B14F-4D97-AF65-F5344CB8AC3E}">
+        <p14:creationId xmlns:p14="http://schemas.microsoft.com/office/powerpoint/2010/main" val="598327348"/>
+      </p:ext>
+    </p:extLst>
   </p:cSld>
   <p:clrMapOvr>
     <a:masterClrMapping/>
@@ -1938,11 +1995,11 @@
           <a:bodyPr/>
           <a:lstStyle/>
           <a:p>
-            <a:fld id="{A82557F8-C590-4812-81B0-0D1326F3AC0C}" type="datetimeFigureOut">
-              <a:rPr lang="he-IL" smtClean="0"/>
-              <a:t>ג'/אייר/תשע"ב</a:t>
+            <a:fld id="{402794DC-014F-427E-AFF1-CD343D3BB4A7}" type="datetimeFigureOut">
+              <a:rPr lang="en-US" smtClean="0"/>
+              <a:t>4/30/2012</a:t>
             </a:fld>
-            <a:endParaRPr lang="he-IL"/>
+            <a:endParaRPr lang="en-US"/>
           </a:p>
         </p:txBody>
       </p:sp>
@@ -1961,7 +2018,7 @@
           <a:bodyPr/>
           <a:lstStyle/>
           <a:p>
-            <a:endParaRPr lang="he-IL"/>
+            <a:endParaRPr lang="en-US"/>
           </a:p>
         </p:txBody>
       </p:sp>
@@ -1980,15 +2037,20 @@
           <a:bodyPr/>
           <a:lstStyle/>
           <a:p>
-            <a:fld id="{E2414829-E055-48A8-B3F9-33C5147C1A36}" type="slidenum">
-              <a:rPr lang="he-IL" smtClean="0"/>
+            <a:fld id="{A2AD3433-B990-4A9D-B3C5-8349BA3332EE}" type="slidenum">
+              <a:rPr lang="en-US" smtClean="0"/>
               <a:t>‹#›</a:t>
             </a:fld>
-            <a:endParaRPr lang="he-IL"/>
+            <a:endParaRPr lang="en-US"/>
           </a:p>
         </p:txBody>
       </p:sp>
     </p:spTree>
+    <p:extLst>
+      <p:ext uri="{BB962C8B-B14F-4D97-AF65-F5344CB8AC3E}">
+        <p14:creationId xmlns:p14="http://schemas.microsoft.com/office/powerpoint/2010/main" val="1096931460"/>
+      </p:ext>
+    </p:extLst>
   </p:cSld>
   <p:clrMapOvr>
     <a:masterClrMapping/>
@@ -2025,14 +2087,14 @@
         </p:nvSpPr>
         <p:spPr>
           <a:xfrm>
-            <a:off x="457200" y="273050"/>
-            <a:ext cx="3008313" cy="1162050"/>
+            <a:off x="342900" y="364067"/>
+            <a:ext cx="2256235" cy="1549400"/>
           </a:xfrm>
         </p:spPr>
         <p:txBody>
           <a:bodyPr anchor="b"/>
           <a:lstStyle>
-            <a:lvl1pPr algn="r">
+            <a:lvl1pPr algn="l">
               <a:defRPr sz="2000" b="1"/>
             </a:lvl1pPr>
           </a:lstStyle>
@@ -2041,7 +2103,7 @@
               <a:rPr lang="en-US" smtClean="0"/>
               <a:t>Click to edit Master title style</a:t>
             </a:r>
-            <a:endParaRPr lang="he-IL"/>
+            <a:endParaRPr lang="en-US"/>
           </a:p>
         </p:txBody>
       </p:sp>
@@ -2057,8 +2119,8 @@
         </p:nvSpPr>
         <p:spPr>
           <a:xfrm>
-            <a:off x="3575050" y="273050"/>
-            <a:ext cx="5111750" cy="5853113"/>
+            <a:off x="2681287" y="364067"/>
+            <a:ext cx="3833813" cy="7804151"/>
           </a:xfrm>
         </p:spPr>
         <p:txBody>
@@ -2126,7 +2188,7 @@
               <a:rPr lang="en-US" smtClean="0"/>
               <a:t>Fifth level</a:t>
             </a:r>
-            <a:endParaRPr lang="he-IL"/>
+            <a:endParaRPr lang="en-US"/>
           </a:p>
         </p:txBody>
       </p:sp>
@@ -2142,8 +2204,8 @@
         </p:nvSpPr>
         <p:spPr>
           <a:xfrm>
-            <a:off x="457200" y="1435100"/>
-            <a:ext cx="3008313" cy="4691063"/>
+            <a:off x="342900" y="1913467"/>
+            <a:ext cx="2256235" cy="6254751"/>
           </a:xfrm>
         </p:spPr>
         <p:txBody>
@@ -2210,11 +2272,11 @@
           <a:bodyPr/>
           <a:lstStyle/>
           <a:p>
-            <a:fld id="{A82557F8-C590-4812-81B0-0D1326F3AC0C}" type="datetimeFigureOut">
-              <a:rPr lang="he-IL" smtClean="0"/>
-              <a:t>ג'/אייר/תשע"ב</a:t>
+            <a:fld id="{402794DC-014F-427E-AFF1-CD343D3BB4A7}" type="datetimeFigureOut">
+              <a:rPr lang="en-US" smtClean="0"/>
+              <a:t>4/30/2012</a:t>
             </a:fld>
-            <a:endParaRPr lang="he-IL"/>
+            <a:endParaRPr lang="en-US"/>
           </a:p>
         </p:txBody>
       </p:sp>
@@ -2233,7 +2295,7 @@
           <a:bodyPr/>
           <a:lstStyle/>
           <a:p>
-            <a:endParaRPr lang="he-IL"/>
+            <a:endParaRPr lang="en-US"/>
           </a:p>
         </p:txBody>
       </p:sp>
@@ -2252,15 +2314,20 @@
           <a:bodyPr/>
           <a:lstStyle/>
           <a:p>
-            <a:fld id="{E2414829-E055-48A8-B3F9-33C5147C1A36}" type="slidenum">
-              <a:rPr lang="he-IL" smtClean="0"/>
+            <a:fld id="{A2AD3433-B990-4A9D-B3C5-8349BA3332EE}" type="slidenum">
+              <a:rPr lang="en-US" smtClean="0"/>
               <a:t>‹#›</a:t>
             </a:fld>
-            <a:endParaRPr lang="he-IL"/>
+            <a:endParaRPr lang="en-US"/>
           </a:p>
         </p:txBody>
       </p:sp>
     </p:spTree>
+    <p:extLst>
+      <p:ext uri="{BB962C8B-B14F-4D97-AF65-F5344CB8AC3E}">
+        <p14:creationId xmlns:p14="http://schemas.microsoft.com/office/powerpoint/2010/main" val="218637145"/>
+      </p:ext>
+    </p:extLst>
   </p:cSld>
   <p:clrMapOvr>
     <a:masterClrMapping/>
@@ -2297,14 +2364,14 @@
         </p:nvSpPr>
         <p:spPr>
           <a:xfrm>
-            <a:off x="1792288" y="4800600"/>
-            <a:ext cx="5486400" cy="566738"/>
+            <a:off x="1344216" y="6400800"/>
+            <a:ext cx="4114800" cy="755651"/>
           </a:xfrm>
         </p:spPr>
         <p:txBody>
           <a:bodyPr anchor="b"/>
           <a:lstStyle>
-            <a:lvl1pPr algn="r">
+            <a:lvl1pPr algn="l">
               <a:defRPr sz="2000" b="1"/>
             </a:lvl1pPr>
           </a:lstStyle>
@@ -2313,7 +2380,7 @@
               <a:rPr lang="en-US" smtClean="0"/>
               <a:t>Click to edit Master title style</a:t>
             </a:r>
-            <a:endParaRPr lang="he-IL"/>
+            <a:endParaRPr lang="en-US"/>
           </a:p>
         </p:txBody>
       </p:sp>
@@ -2329,8 +2396,8 @@
         </p:nvSpPr>
         <p:spPr>
           <a:xfrm>
-            <a:off x="1792288" y="612775"/>
-            <a:ext cx="5486400" cy="4114800"/>
+            <a:off x="1344216" y="817033"/>
+            <a:ext cx="4114800" cy="5486400"/>
           </a:xfrm>
         </p:spPr>
         <p:txBody>
@@ -2374,7 +2441,7 @@
             </a:lvl9pPr>
           </a:lstStyle>
           <a:p>
-            <a:endParaRPr lang="he-IL"/>
+            <a:endParaRPr lang="en-US"/>
           </a:p>
         </p:txBody>
       </p:sp>
@@ -2390,8 +2457,8 @@
         </p:nvSpPr>
         <p:spPr>
           <a:xfrm>
-            <a:off x="1792288" y="5367338"/>
-            <a:ext cx="5486400" cy="804862"/>
+            <a:off x="1344216" y="7156451"/>
+            <a:ext cx="4114800" cy="1073149"/>
           </a:xfrm>
         </p:spPr>
         <p:txBody>
@@ -2458,11 +2525,11 @@
           <a:bodyPr/>
           <a:lstStyle/>
           <a:p>
-            <a:fld id="{A82557F8-C590-4812-81B0-0D1326F3AC0C}" type="datetimeFigureOut">
-              <a:rPr lang="he-IL" smtClean="0"/>
-              <a:t>ג'/אייר/תשע"ב</a:t>
+            <a:fld id="{402794DC-014F-427E-AFF1-CD343D3BB4A7}" type="datetimeFigureOut">
+              <a:rPr lang="en-US" smtClean="0"/>
+              <a:t>4/30/2012</a:t>
             </a:fld>
-            <a:endParaRPr lang="he-IL"/>
+            <a:endParaRPr lang="en-US"/>
           </a:p>
         </p:txBody>
       </p:sp>
@@ -2481,7 +2548,7 @@
           <a:bodyPr/>
           <a:lstStyle/>
           <a:p>
-            <a:endParaRPr lang="he-IL"/>
+            <a:endParaRPr lang="en-US"/>
           </a:p>
         </p:txBody>
       </p:sp>
@@ -2500,15 +2567,20 @@
           <a:bodyPr/>
           <a:lstStyle/>
           <a:p>
-            <a:fld id="{E2414829-E055-48A8-B3F9-33C5147C1A36}" type="slidenum">
-              <a:rPr lang="he-IL" smtClean="0"/>
+            <a:fld id="{A2AD3433-B990-4A9D-B3C5-8349BA3332EE}" type="slidenum">
+              <a:rPr lang="en-US" smtClean="0"/>
               <a:t>‹#›</a:t>
             </a:fld>
-            <a:endParaRPr lang="he-IL"/>
+            <a:endParaRPr lang="en-US"/>
           </a:p>
         </p:txBody>
       </p:sp>
     </p:spTree>
+    <p:extLst>
+      <p:ext uri="{BB962C8B-B14F-4D97-AF65-F5344CB8AC3E}">
+        <p14:creationId xmlns:p14="http://schemas.microsoft.com/office/powerpoint/2010/main" val="3081025302"/>
+      </p:ext>
+    </p:extLst>
   </p:cSld>
   <p:clrMapOvr>
     <a:masterClrMapping/>
@@ -2550,15 +2622,15 @@
         </p:nvSpPr>
         <p:spPr>
           <a:xfrm>
-            <a:off x="457200" y="274638"/>
-            <a:ext cx="8229600" cy="1143000"/>
+            <a:off x="342900" y="366184"/>
+            <a:ext cx="6172200" cy="1524000"/>
           </a:xfrm>
           <a:prstGeom prst="rect">
             <a:avLst/>
           </a:prstGeom>
         </p:spPr>
         <p:txBody>
-          <a:bodyPr vert="horz" lIns="91440" tIns="45720" rIns="91440" bIns="45720" rtlCol="1" anchor="ctr">
+          <a:bodyPr vert="horz" lIns="91440" tIns="45720" rIns="91440" bIns="45720" rtlCol="0" anchor="ctr">
             <a:normAutofit/>
           </a:bodyPr>
           <a:lstStyle/>
@@ -2567,7 +2639,7 @@
               <a:rPr lang="en-US" smtClean="0"/>
               <a:t>Click to edit Master title style</a:t>
             </a:r>
-            <a:endParaRPr lang="he-IL"/>
+            <a:endParaRPr lang="en-US"/>
           </a:p>
         </p:txBody>
       </p:sp>
@@ -2583,15 +2655,15 @@
         </p:nvSpPr>
         <p:spPr>
           <a:xfrm>
-            <a:off x="457200" y="1600200"/>
-            <a:ext cx="8229600" cy="4525963"/>
+            <a:off x="342900" y="2133601"/>
+            <a:ext cx="6172200" cy="6034617"/>
           </a:xfrm>
           <a:prstGeom prst="rect">
             <a:avLst/>
           </a:prstGeom>
         </p:spPr>
         <p:txBody>
-          <a:bodyPr vert="horz" lIns="91440" tIns="45720" rIns="91440" bIns="45720" rtlCol="1">
+          <a:bodyPr vert="horz" lIns="91440" tIns="45720" rIns="91440" bIns="45720" rtlCol="0">
             <a:normAutofit/>
           </a:bodyPr>
           <a:lstStyle/>
@@ -2629,7 +2701,7 @@
               <a:rPr lang="en-US" smtClean="0"/>
               <a:t>Fifth level</a:t>
             </a:r>
-            <a:endParaRPr lang="he-IL"/>
+            <a:endParaRPr lang="en-US"/>
           </a:p>
         </p:txBody>
       </p:sp>
@@ -2645,17 +2717,17 @@
         </p:nvSpPr>
         <p:spPr>
           <a:xfrm>
-            <a:off x="6553200" y="6356350"/>
-            <a:ext cx="2133600" cy="365125"/>
+            <a:off x="342900" y="8475134"/>
+            <a:ext cx="1600200" cy="486833"/>
           </a:xfrm>
           <a:prstGeom prst="rect">
             <a:avLst/>
           </a:prstGeom>
         </p:spPr>
         <p:txBody>
-          <a:bodyPr vert="horz" lIns="91440" tIns="45720" rIns="91440" bIns="45720" rtlCol="1" anchor="ctr"/>
+          <a:bodyPr vert="horz" lIns="91440" tIns="45720" rIns="91440" bIns="45720" rtlCol="0" anchor="ctr"/>
           <a:lstStyle>
-            <a:lvl1pPr algn="r">
+            <a:lvl1pPr algn="l">
               <a:defRPr sz="1200">
                 <a:solidFill>
                   <a:schemeClr val="tx1">
@@ -2666,11 +2738,11 @@
             </a:lvl1pPr>
           </a:lstStyle>
           <a:p>
-            <a:fld id="{A82557F8-C590-4812-81B0-0D1326F3AC0C}" type="datetimeFigureOut">
-              <a:rPr lang="he-IL" smtClean="0"/>
-              <a:t>ג'/אייר/תשע"ב</a:t>
+            <a:fld id="{402794DC-014F-427E-AFF1-CD343D3BB4A7}" type="datetimeFigureOut">
+              <a:rPr lang="en-US" smtClean="0"/>
+              <a:t>4/30/2012</a:t>
             </a:fld>
-            <a:endParaRPr lang="he-IL"/>
+            <a:endParaRPr lang="en-US"/>
           </a:p>
         </p:txBody>
       </p:sp>
@@ -2686,15 +2758,15 @@
         </p:nvSpPr>
         <p:spPr>
           <a:xfrm>
-            <a:off x="3124200" y="6356350"/>
-            <a:ext cx="2895600" cy="365125"/>
+            <a:off x="2343150" y="8475134"/>
+            <a:ext cx="2171700" cy="486833"/>
           </a:xfrm>
           <a:prstGeom prst="rect">
             <a:avLst/>
           </a:prstGeom>
         </p:spPr>
         <p:txBody>
-          <a:bodyPr vert="horz" lIns="91440" tIns="45720" rIns="91440" bIns="45720" rtlCol="1" anchor="ctr"/>
+          <a:bodyPr vert="horz" lIns="91440" tIns="45720" rIns="91440" bIns="45720" rtlCol="0" anchor="ctr"/>
           <a:lstStyle>
             <a:lvl1pPr algn="ctr">
               <a:defRPr sz="1200">
@@ -2707,7 +2779,7 @@
             </a:lvl1pPr>
           </a:lstStyle>
           <a:p>
-            <a:endParaRPr lang="he-IL"/>
+            <a:endParaRPr lang="en-US"/>
           </a:p>
         </p:txBody>
       </p:sp>
@@ -2723,17 +2795,17 @@
         </p:nvSpPr>
         <p:spPr>
           <a:xfrm>
-            <a:off x="457200" y="6356350"/>
-            <a:ext cx="2133600" cy="365125"/>
+            <a:off x="4914900" y="8475134"/>
+            <a:ext cx="1600200" cy="486833"/>
           </a:xfrm>
           <a:prstGeom prst="rect">
             <a:avLst/>
           </a:prstGeom>
         </p:spPr>
         <p:txBody>
-          <a:bodyPr vert="horz" lIns="91440" tIns="45720" rIns="91440" bIns="45720" rtlCol="1" anchor="ctr"/>
+          <a:bodyPr vert="horz" lIns="91440" tIns="45720" rIns="91440" bIns="45720" rtlCol="0" anchor="ctr"/>
           <a:lstStyle>
-            <a:lvl1pPr algn="l">
+            <a:lvl1pPr algn="r">
               <a:defRPr sz="1200">
                 <a:solidFill>
                   <a:schemeClr val="tx1">
@@ -2744,15 +2816,20 @@
             </a:lvl1pPr>
           </a:lstStyle>
           <a:p>
-            <a:fld id="{E2414829-E055-48A8-B3F9-33C5147C1A36}" type="slidenum">
-              <a:rPr lang="he-IL" smtClean="0"/>
+            <a:fld id="{A2AD3433-B990-4A9D-B3C5-8349BA3332EE}" type="slidenum">
+              <a:rPr lang="en-US" smtClean="0"/>
               <a:t>‹#›</a:t>
             </a:fld>
-            <a:endParaRPr lang="he-IL"/>
+            <a:endParaRPr lang="en-US"/>
           </a:p>
         </p:txBody>
       </p:sp>
     </p:spTree>
+    <p:extLst>
+      <p:ext uri="{BB962C8B-B14F-4D97-AF65-F5344CB8AC3E}">
+        <p14:creationId xmlns:p14="http://schemas.microsoft.com/office/powerpoint/2010/main" val="1691666551"/>
+      </p:ext>
+    </p:extLst>
   </p:cSld>
   <p:clrMap bg1="lt1" tx1="dk1" bg2="lt2" tx2="dk2" accent1="accent1" accent2="accent2" accent3="accent3" accent4="accent4" accent5="accent5" accent6="accent6" hlink="hlink" folHlink="folHlink"/>
   <p:sldLayoutIdLst>
@@ -2770,7 +2847,7 @@
   </p:sldLayoutIdLst>
   <p:txStyles>
     <p:titleStyle>
-      <a:lvl1pPr algn="ctr" defTabSz="914400" rtl="1" eaLnBrk="1" latinLnBrk="0" hangingPunct="1">
+      <a:lvl1pPr algn="ctr" defTabSz="914400" rtl="0" eaLnBrk="1" latinLnBrk="0" hangingPunct="1">
         <a:spcBef>
           <a:spcPct val="0"/>
         </a:spcBef>
@@ -2786,7 +2863,7 @@
       </a:lvl1pPr>
     </p:titleStyle>
     <p:bodyStyle>
-      <a:lvl1pPr marL="342900" indent="-342900" algn="r" defTabSz="914400" rtl="1" eaLnBrk="1" latinLnBrk="0" hangingPunct="1">
+      <a:lvl1pPr marL="342900" indent="-342900" algn="l" defTabSz="914400" rtl="0" eaLnBrk="1" latinLnBrk="0" hangingPunct="1">
         <a:spcBef>
           <a:spcPct val="20000"/>
         </a:spcBef>
@@ -2801,7 +2878,7 @@
           <a:cs typeface="+mn-cs"/>
         </a:defRPr>
       </a:lvl1pPr>
-      <a:lvl2pPr marL="742950" indent="-285750" algn="r" defTabSz="914400" rtl="1" eaLnBrk="1" latinLnBrk="0" hangingPunct="1">
+      <a:lvl2pPr marL="742950" indent="-285750" algn="l" defTabSz="914400" rtl="0" eaLnBrk="1" latinLnBrk="0" hangingPunct="1">
         <a:spcBef>
           <a:spcPct val="20000"/>
         </a:spcBef>
@@ -2816,7 +2893,7 @@
           <a:cs typeface="+mn-cs"/>
         </a:defRPr>
       </a:lvl2pPr>
-      <a:lvl3pPr marL="1143000" indent="-228600" algn="r" defTabSz="914400" rtl="1" eaLnBrk="1" latinLnBrk="0" hangingPunct="1">
+      <a:lvl3pPr marL="1143000" indent="-228600" algn="l" defTabSz="914400" rtl="0" eaLnBrk="1" latinLnBrk="0" hangingPunct="1">
         <a:spcBef>
           <a:spcPct val="20000"/>
         </a:spcBef>
@@ -2831,7 +2908,7 @@
           <a:cs typeface="+mn-cs"/>
         </a:defRPr>
       </a:lvl3pPr>
-      <a:lvl4pPr marL="1600200" indent="-228600" algn="r" defTabSz="914400" rtl="1" eaLnBrk="1" latinLnBrk="0" hangingPunct="1">
+      <a:lvl4pPr marL="1600200" indent="-228600" algn="l" defTabSz="914400" rtl="0" eaLnBrk="1" latinLnBrk="0" hangingPunct="1">
         <a:spcBef>
           <a:spcPct val="20000"/>
         </a:spcBef>
@@ -2846,7 +2923,7 @@
           <a:cs typeface="+mn-cs"/>
         </a:defRPr>
       </a:lvl4pPr>
-      <a:lvl5pPr marL="2057400" indent="-228600" algn="r" defTabSz="914400" rtl="1" eaLnBrk="1" latinLnBrk="0" hangingPunct="1">
+      <a:lvl5pPr marL="2057400" indent="-228600" algn="l" defTabSz="914400" rtl="0" eaLnBrk="1" latinLnBrk="0" hangingPunct="1">
         <a:spcBef>
           <a:spcPct val="20000"/>
         </a:spcBef>
@@ -2861,7 +2938,7 @@
           <a:cs typeface="+mn-cs"/>
         </a:defRPr>
       </a:lvl5pPr>
-      <a:lvl6pPr marL="2514600" indent="-228600" algn="r" defTabSz="914400" rtl="1" eaLnBrk="1" latinLnBrk="0" hangingPunct="1">
+      <a:lvl6pPr marL="2514600" indent="-228600" algn="l" defTabSz="914400" rtl="0" eaLnBrk="1" latinLnBrk="0" hangingPunct="1">
         <a:spcBef>
           <a:spcPct val="20000"/>
         </a:spcBef>
@@ -2876,7 +2953,7 @@
           <a:cs typeface="+mn-cs"/>
         </a:defRPr>
       </a:lvl6pPr>
-      <a:lvl7pPr marL="2971800" indent="-228600" algn="r" defTabSz="914400" rtl="1" eaLnBrk="1" latinLnBrk="0" hangingPunct="1">
+      <a:lvl7pPr marL="2971800" indent="-228600" algn="l" defTabSz="914400" rtl="0" eaLnBrk="1" latinLnBrk="0" hangingPunct="1">
         <a:spcBef>
           <a:spcPct val="20000"/>
         </a:spcBef>
@@ -2891,7 +2968,7 @@
           <a:cs typeface="+mn-cs"/>
         </a:defRPr>
       </a:lvl7pPr>
-      <a:lvl8pPr marL="3429000" indent="-228600" algn="r" defTabSz="914400" rtl="1" eaLnBrk="1" latinLnBrk="0" hangingPunct="1">
+      <a:lvl8pPr marL="3429000" indent="-228600" algn="l" defTabSz="914400" rtl="0" eaLnBrk="1" latinLnBrk="0" hangingPunct="1">
         <a:spcBef>
           <a:spcPct val="20000"/>
         </a:spcBef>
@@ -2906,7 +2983,7 @@
           <a:cs typeface="+mn-cs"/>
         </a:defRPr>
       </a:lvl8pPr>
-      <a:lvl9pPr marL="3886200" indent="-228600" algn="r" defTabSz="914400" rtl="1" eaLnBrk="1" latinLnBrk="0" hangingPunct="1">
+      <a:lvl9pPr marL="3886200" indent="-228600" algn="l" defTabSz="914400" rtl="0" eaLnBrk="1" latinLnBrk="0" hangingPunct="1">
         <a:spcBef>
           <a:spcPct val="20000"/>
         </a:spcBef>
@@ -2924,9 +3001,9 @@
     </p:bodyStyle>
     <p:otherStyle>
       <a:defPPr>
-        <a:defRPr lang="he-IL"/>
+        <a:defRPr lang="en-US"/>
       </a:defPPr>
-      <a:lvl1pPr marL="0" algn="r" defTabSz="914400" rtl="1" eaLnBrk="1" latinLnBrk="0" hangingPunct="1">
+      <a:lvl1pPr marL="0" algn="l" defTabSz="914400" rtl="0" eaLnBrk="1" latinLnBrk="0" hangingPunct="1">
         <a:defRPr sz="1800" kern="1200">
           <a:solidFill>
             <a:schemeClr val="tx1"/>
@@ -2936,7 +3013,7 @@
           <a:cs typeface="+mn-cs"/>
         </a:defRPr>
       </a:lvl1pPr>
-      <a:lvl2pPr marL="457200" algn="r" defTabSz="914400" rtl="1" eaLnBrk="1" latinLnBrk="0" hangingPunct="1">
+      <a:lvl2pPr marL="457200" algn="l" defTabSz="914400" rtl="0" eaLnBrk="1" latinLnBrk="0" hangingPunct="1">
         <a:defRPr sz="1800" kern="1200">
           <a:solidFill>
             <a:schemeClr val="tx1"/>
@@ -2946,7 +3023,7 @@
           <a:cs typeface="+mn-cs"/>
         </a:defRPr>
       </a:lvl2pPr>
-      <a:lvl3pPr marL="914400" algn="r" defTabSz="914400" rtl="1" eaLnBrk="1" latinLnBrk="0" hangingPunct="1">
+      <a:lvl3pPr marL="914400" algn="l" defTabSz="914400" rtl="0" eaLnBrk="1" latinLnBrk="0" hangingPunct="1">
         <a:defRPr sz="1800" kern="1200">
           <a:solidFill>
             <a:schemeClr val="tx1"/>
@@ -2956,7 +3033,7 @@
           <a:cs typeface="+mn-cs"/>
         </a:defRPr>
       </a:lvl3pPr>
-      <a:lvl4pPr marL="1371600" algn="r" defTabSz="914400" rtl="1" eaLnBrk="1" latinLnBrk="0" hangingPunct="1">
+      <a:lvl4pPr marL="1371600" algn="l" defTabSz="914400" rtl="0" eaLnBrk="1" latinLnBrk="0" hangingPunct="1">
         <a:defRPr sz="1800" kern="1200">
           <a:solidFill>
             <a:schemeClr val="tx1"/>
@@ -2966,7 +3043,7 @@
           <a:cs typeface="+mn-cs"/>
         </a:defRPr>
       </a:lvl4pPr>
-      <a:lvl5pPr marL="1828800" algn="r" defTabSz="914400" rtl="1" eaLnBrk="1" latinLnBrk="0" hangingPunct="1">
+      <a:lvl5pPr marL="1828800" algn="l" defTabSz="914400" rtl="0" eaLnBrk="1" latinLnBrk="0" hangingPunct="1">
         <a:defRPr sz="1800" kern="1200">
           <a:solidFill>
             <a:schemeClr val="tx1"/>
@@ -2976,7 +3053,7 @@
           <a:cs typeface="+mn-cs"/>
         </a:defRPr>
       </a:lvl5pPr>
-      <a:lvl6pPr marL="2286000" algn="r" defTabSz="914400" rtl="1" eaLnBrk="1" latinLnBrk="0" hangingPunct="1">
+      <a:lvl6pPr marL="2286000" algn="l" defTabSz="914400" rtl="0" eaLnBrk="1" latinLnBrk="0" hangingPunct="1">
         <a:defRPr sz="1800" kern="1200">
           <a:solidFill>
             <a:schemeClr val="tx1"/>
@@ -2986,7 +3063,7 @@
           <a:cs typeface="+mn-cs"/>
         </a:defRPr>
       </a:lvl6pPr>
-      <a:lvl7pPr marL="2743200" algn="r" defTabSz="914400" rtl="1" eaLnBrk="1" latinLnBrk="0" hangingPunct="1">
+      <a:lvl7pPr marL="2743200" algn="l" defTabSz="914400" rtl="0" eaLnBrk="1" latinLnBrk="0" hangingPunct="1">
         <a:defRPr sz="1800" kern="1200">
           <a:solidFill>
             <a:schemeClr val="tx1"/>
@@ -2996,7 +3073,7 @@
           <a:cs typeface="+mn-cs"/>
         </a:defRPr>
       </a:lvl7pPr>
-      <a:lvl8pPr marL="3200400" algn="r" defTabSz="914400" rtl="1" eaLnBrk="1" latinLnBrk="0" hangingPunct="1">
+      <a:lvl8pPr marL="3200400" algn="l" defTabSz="914400" rtl="0" eaLnBrk="1" latinLnBrk="0" hangingPunct="1">
         <a:defRPr sz="1800" kern="1200">
           <a:solidFill>
             <a:schemeClr val="tx1"/>
@@ -3006,7 +3083,7 @@
           <a:cs typeface="+mn-cs"/>
         </a:defRPr>
       </a:lvl8pPr>
-      <a:lvl9pPr marL="3657600" algn="r" defTabSz="914400" rtl="1" eaLnBrk="1" latinLnBrk="0" hangingPunct="1">
+      <a:lvl9pPr marL="3657600" algn="l" defTabSz="914400" rtl="0" eaLnBrk="1" latinLnBrk="0" hangingPunct="1">
         <a:defRPr sz="1800" kern="1200">
           <a:solidFill>
             <a:schemeClr val="tx1"/>
@@ -3040,14 +3117,20 @@
       </p:grpSpPr>
       <p:pic>
         <p:nvPicPr>
-          <p:cNvPr id="1026" name="Picture 2"/>
+          <p:cNvPr id="1026" name="Picture 2" descr="C:\Users\tom\Documents\frameMarkers\frameMarker_000.png"/>
           <p:cNvPicPr>
             <a:picLocks noChangeAspect="1" noChangeArrowheads="1"/>
           </p:cNvPicPr>
           <p:nvPr/>
         </p:nvPicPr>
         <p:blipFill>
-          <a:blip r:embed="rId2" cstate="print"/>
+          <a:blip r:embed="rId2">
+            <a:extLst>
+              <a:ext uri="{28A0092B-C50C-407E-A947-70E740481C1C}">
+                <a14:useLocalDpi xmlns:a14="http://schemas.microsoft.com/office/drawing/2010/main" val="0"/>
+              </a:ext>
+            </a:extLst>
+          </a:blip>
           <a:srcRect/>
           <a:stretch>
             <a:fillRect/>
@@ -3055,22 +3138,1447 @@
         </p:blipFill>
         <p:spPr bwMode="auto">
           <a:xfrm>
-            <a:off x="2509838" y="1366838"/>
-            <a:ext cx="4124325" cy="4124325"/>
+            <a:off x="0" y="1143000"/>
+            <a:ext cx="6858000" cy="6858001"/>
           </a:xfrm>
           <a:prstGeom prst="rect">
             <a:avLst/>
           </a:prstGeom>
           <a:noFill/>
-          <a:ln w="9525">
-            <a:noFill/>
-            <a:miter lim="800000"/>
-            <a:headEnd/>
-            <a:tailEnd/>
-          </a:ln>
+          <a:extLst>
+            <a:ext uri="{909E8E84-426E-40DD-AFC4-6F175D3DCCD1}">
+              <a14:hiddenFill xmlns:a14="http://schemas.microsoft.com/office/drawing/2010/main">
+                <a:solidFill>
+                  <a:srgbClr val="FFFFFF"/>
+                </a:solidFill>
+              </a14:hiddenFill>
+            </a:ext>
+          </a:extLst>
         </p:spPr>
       </p:pic>
+      <p:sp>
+        <p:nvSpPr>
+          <p:cNvPr id="4" name="Isosceles Triangle 3"/>
+          <p:cNvSpPr/>
+          <p:nvPr/>
+        </p:nvSpPr>
+        <p:spPr>
+          <a:xfrm>
+            <a:off x="3028950" y="0"/>
+            <a:ext cx="800100" cy="190500"/>
+          </a:xfrm>
+          <a:prstGeom prst="triangle">
+            <a:avLst/>
+          </a:prstGeom>
+        </p:spPr>
+        <p:style>
+          <a:lnRef idx="2">
+            <a:schemeClr val="accent1">
+              <a:shade val="50000"/>
+            </a:schemeClr>
+          </a:lnRef>
+          <a:fillRef idx="1">
+            <a:schemeClr val="accent1"/>
+          </a:fillRef>
+          <a:effectRef idx="0">
+            <a:schemeClr val="accent1"/>
+          </a:effectRef>
+          <a:fontRef idx="minor">
+            <a:schemeClr val="lt1"/>
+          </a:fontRef>
+        </p:style>
+        <p:txBody>
+          <a:bodyPr rtlCol="0" anchor="ctr"/>
+          <a:lstStyle/>
+          <a:p>
+            <a:pPr algn="ctr"/>
+            <a:endParaRPr lang="en-US"/>
+          </a:p>
+        </p:txBody>
+      </p:sp>
+      <p:sp>
+        <p:nvSpPr>
+          <p:cNvPr id="5" name="Rectangle 4"/>
+          <p:cNvSpPr/>
+          <p:nvPr/>
+        </p:nvSpPr>
+        <p:spPr>
+          <a:xfrm>
+            <a:off x="2818819" y="3787170"/>
+            <a:ext cx="1220362" cy="1569660"/>
+          </a:xfrm>
+          <a:prstGeom prst="rect">
+            <a:avLst/>
+          </a:prstGeom>
+          <a:noFill/>
+        </p:spPr>
+        <p:txBody>
+          <a:bodyPr wrap="square" lIns="91440" tIns="45720" rIns="91440" bIns="45720">
+            <a:spAutoFit/>
+          </a:bodyPr>
+          <a:lstStyle/>
+          <a:p>
+            <a:pPr algn="ctr"/>
+            <a:r>
+              <a:rPr lang="en-US" sz="9600" b="1" cap="none" spc="0" dirty="0" smtClean="0">
+                <a:ln w="12700">
+                  <a:solidFill>
+                    <a:schemeClr val="tx2">
+                      <a:satMod val="155000"/>
+                    </a:schemeClr>
+                  </a:solidFill>
+                  <a:prstDash val="solid"/>
+                </a:ln>
+                <a:solidFill>
+                  <a:schemeClr val="bg2">
+                    <a:tint val="85000"/>
+                    <a:satMod val="155000"/>
+                  </a:schemeClr>
+                </a:solidFill>
+                <a:effectLst>
+                  <a:outerShdw blurRad="41275" dist="20320" dir="1800000" algn="tl" rotWithShape="0">
+                    <a:srgbClr val="000000">
+                      <a:alpha val="40000"/>
+                    </a:srgbClr>
+                  </a:outerShdw>
+                </a:effectLst>
+              </a:rPr>
+              <a:t>0</a:t>
+            </a:r>
+            <a:endParaRPr lang="en-US" sz="9600" b="1" cap="none" spc="0" dirty="0">
+              <a:ln w="12700">
+                <a:solidFill>
+                  <a:schemeClr val="tx2">
+                    <a:satMod val="155000"/>
+                  </a:schemeClr>
+                </a:solidFill>
+                <a:prstDash val="solid"/>
+              </a:ln>
+              <a:solidFill>
+                <a:schemeClr val="bg2">
+                  <a:tint val="85000"/>
+                  <a:satMod val="155000"/>
+                </a:schemeClr>
+              </a:solidFill>
+              <a:effectLst>
+                <a:outerShdw blurRad="41275" dist="20320" dir="1800000" algn="tl" rotWithShape="0">
+                  <a:srgbClr val="000000">
+                    <a:alpha val="40000"/>
+                  </a:srgbClr>
+                </a:outerShdw>
+              </a:effectLst>
+            </a:endParaRPr>
+          </a:p>
+        </p:txBody>
+      </p:sp>
     </p:spTree>
+    <p:extLst>
+      <p:ext uri="{BB962C8B-B14F-4D97-AF65-F5344CB8AC3E}">
+        <p14:creationId xmlns:p14="http://schemas.microsoft.com/office/powerpoint/2010/main" val="1045670102"/>
+      </p:ext>
+    </p:extLst>
+  </p:cSld>
+  <p:clrMapOvr>
+    <a:masterClrMapping/>
+  </p:clrMapOvr>
+</p:sld>
+</file>
+
+<file path=ppt/slides/slide10.xml><?xml version="1.0" encoding="utf-8"?>
+<p:sld xmlns:a="http://schemas.openxmlformats.org/drawingml/2006/main" xmlns:r="http://schemas.openxmlformats.org/officeDocument/2006/relationships" xmlns:p="http://schemas.openxmlformats.org/presentationml/2006/main">
+  <p:cSld>
+    <p:spTree>
+      <p:nvGrpSpPr>
+        <p:cNvPr id="1" name=""/>
+        <p:cNvGrpSpPr/>
+        <p:nvPr/>
+      </p:nvGrpSpPr>
+      <p:grpSpPr>
+        <a:xfrm>
+          <a:off x="0" y="0"/>
+          <a:ext cx="0" cy="0"/>
+          <a:chOff x="0" y="0"/>
+          <a:chExt cx="0" cy="0"/>
+        </a:xfrm>
+      </p:grpSpPr>
+      <p:pic>
+        <p:nvPicPr>
+          <p:cNvPr id="11266" name="Picture 2" descr="C:\Users\tom\Documents\frameMarkers\frameMarker_010.png"/>
+          <p:cNvPicPr>
+            <a:picLocks noChangeAspect="1" noChangeArrowheads="1"/>
+          </p:cNvPicPr>
+          <p:nvPr/>
+        </p:nvPicPr>
+        <p:blipFill>
+          <a:blip r:embed="rId2">
+            <a:extLst>
+              <a:ext uri="{28A0092B-C50C-407E-A947-70E740481C1C}">
+                <a14:useLocalDpi xmlns:a14="http://schemas.microsoft.com/office/drawing/2010/main" val="0"/>
+              </a:ext>
+            </a:extLst>
+          </a:blip>
+          <a:srcRect/>
+          <a:stretch>
+            <a:fillRect/>
+          </a:stretch>
+        </p:blipFill>
+        <p:spPr bwMode="auto">
+          <a:xfrm>
+            <a:off x="0" y="1143000"/>
+            <a:ext cx="6858001" cy="6858000"/>
+          </a:xfrm>
+          <a:prstGeom prst="rect">
+            <a:avLst/>
+          </a:prstGeom>
+          <a:noFill/>
+          <a:extLst>
+            <a:ext uri="{909E8E84-426E-40DD-AFC4-6F175D3DCCD1}">
+              <a14:hiddenFill xmlns:a14="http://schemas.microsoft.com/office/drawing/2010/main">
+                <a:solidFill>
+                  <a:srgbClr val="FFFFFF"/>
+                </a:solidFill>
+              </a14:hiddenFill>
+            </a:ext>
+          </a:extLst>
+        </p:spPr>
+      </p:pic>
+      <p:sp>
+        <p:nvSpPr>
+          <p:cNvPr id="4" name="Rectangle 3"/>
+          <p:cNvSpPr/>
+          <p:nvPr/>
+        </p:nvSpPr>
+        <p:spPr>
+          <a:xfrm>
+            <a:off x="2818819" y="3787170"/>
+            <a:ext cx="1220362" cy="1569660"/>
+          </a:xfrm>
+          <a:prstGeom prst="rect">
+            <a:avLst/>
+          </a:prstGeom>
+          <a:noFill/>
+        </p:spPr>
+        <p:txBody>
+          <a:bodyPr wrap="square" lIns="91440" tIns="45720" rIns="91440" bIns="45720">
+            <a:spAutoFit/>
+          </a:bodyPr>
+          <a:lstStyle/>
+          <a:p>
+            <a:pPr algn="ctr"/>
+            <a:r>
+              <a:rPr lang="en-US" sz="9600" b="1" cap="none" spc="0" dirty="0" smtClean="0">
+                <a:ln w="12700">
+                  <a:solidFill>
+                    <a:schemeClr val="tx2">
+                      <a:satMod val="155000"/>
+                    </a:schemeClr>
+                  </a:solidFill>
+                  <a:prstDash val="solid"/>
+                </a:ln>
+                <a:solidFill>
+                  <a:schemeClr val="bg2">
+                    <a:tint val="85000"/>
+                    <a:satMod val="155000"/>
+                  </a:schemeClr>
+                </a:solidFill>
+                <a:effectLst>
+                  <a:outerShdw blurRad="41275" dist="20320" dir="1800000" algn="tl" rotWithShape="0">
+                    <a:srgbClr val="000000">
+                      <a:alpha val="40000"/>
+                    </a:srgbClr>
+                  </a:outerShdw>
+                </a:effectLst>
+              </a:rPr>
+              <a:t>9</a:t>
+            </a:r>
+            <a:endParaRPr lang="en-US" sz="9600" b="1" cap="none" spc="0" dirty="0">
+              <a:ln w="12700">
+                <a:solidFill>
+                  <a:schemeClr val="tx2">
+                    <a:satMod val="155000"/>
+                  </a:schemeClr>
+                </a:solidFill>
+                <a:prstDash val="solid"/>
+              </a:ln>
+              <a:solidFill>
+                <a:schemeClr val="bg2">
+                  <a:tint val="85000"/>
+                  <a:satMod val="155000"/>
+                </a:schemeClr>
+              </a:solidFill>
+              <a:effectLst>
+                <a:outerShdw blurRad="41275" dist="20320" dir="1800000" algn="tl" rotWithShape="0">
+                  <a:srgbClr val="000000">
+                    <a:alpha val="40000"/>
+                  </a:srgbClr>
+                </a:outerShdw>
+              </a:effectLst>
+            </a:endParaRPr>
+          </a:p>
+        </p:txBody>
+      </p:sp>
+      <p:sp>
+        <p:nvSpPr>
+          <p:cNvPr id="5" name="Isosceles Triangle 4"/>
+          <p:cNvSpPr/>
+          <p:nvPr/>
+        </p:nvSpPr>
+        <p:spPr>
+          <a:xfrm>
+            <a:off x="3028950" y="0"/>
+            <a:ext cx="800100" cy="190500"/>
+          </a:xfrm>
+          <a:prstGeom prst="triangle">
+            <a:avLst/>
+          </a:prstGeom>
+        </p:spPr>
+        <p:style>
+          <a:lnRef idx="2">
+            <a:schemeClr val="accent1">
+              <a:shade val="50000"/>
+            </a:schemeClr>
+          </a:lnRef>
+          <a:fillRef idx="1">
+            <a:schemeClr val="accent1"/>
+          </a:fillRef>
+          <a:effectRef idx="0">
+            <a:schemeClr val="accent1"/>
+          </a:effectRef>
+          <a:fontRef idx="minor">
+            <a:schemeClr val="lt1"/>
+          </a:fontRef>
+        </p:style>
+        <p:txBody>
+          <a:bodyPr rtlCol="0" anchor="ctr"/>
+          <a:lstStyle/>
+          <a:p>
+            <a:pPr algn="ctr"/>
+            <a:endParaRPr lang="en-US"/>
+          </a:p>
+        </p:txBody>
+      </p:sp>
+    </p:spTree>
+    <p:extLst>
+      <p:ext uri="{BB962C8B-B14F-4D97-AF65-F5344CB8AC3E}">
+        <p14:creationId xmlns:p14="http://schemas.microsoft.com/office/powerpoint/2010/main" val="1139947112"/>
+      </p:ext>
+    </p:extLst>
+  </p:cSld>
+  <p:clrMapOvr>
+    <a:masterClrMapping/>
+  </p:clrMapOvr>
+</p:sld>
+</file>
+
+<file path=ppt/slides/slide11.xml><?xml version="1.0" encoding="utf-8"?>
+<p:sld xmlns:a="http://schemas.openxmlformats.org/drawingml/2006/main" xmlns:r="http://schemas.openxmlformats.org/officeDocument/2006/relationships" xmlns:p="http://schemas.openxmlformats.org/presentationml/2006/main">
+  <p:cSld>
+    <p:spTree>
+      <p:nvGrpSpPr>
+        <p:cNvPr id="1" name=""/>
+        <p:cNvGrpSpPr/>
+        <p:nvPr/>
+      </p:nvGrpSpPr>
+      <p:grpSpPr>
+        <a:xfrm>
+          <a:off x="0" y="0"/>
+          <a:ext cx="0" cy="0"/>
+          <a:chOff x="0" y="0"/>
+          <a:chExt cx="0" cy="0"/>
+        </a:xfrm>
+      </p:grpSpPr>
+      <p:pic>
+        <p:nvPicPr>
+          <p:cNvPr id="12290" name="Picture 2" descr="C:\Users\tom\Documents\frameMarkers\frameMarker_011.png"/>
+          <p:cNvPicPr>
+            <a:picLocks noChangeAspect="1" noChangeArrowheads="1"/>
+          </p:cNvPicPr>
+          <p:nvPr/>
+        </p:nvPicPr>
+        <p:blipFill>
+          <a:blip r:embed="rId2">
+            <a:extLst>
+              <a:ext uri="{28A0092B-C50C-407E-A947-70E740481C1C}">
+                <a14:useLocalDpi xmlns:a14="http://schemas.microsoft.com/office/drawing/2010/main" val="0"/>
+              </a:ext>
+            </a:extLst>
+          </a:blip>
+          <a:srcRect/>
+          <a:stretch>
+            <a:fillRect/>
+          </a:stretch>
+        </p:blipFill>
+        <p:spPr bwMode="auto">
+          <a:xfrm>
+            <a:off x="0" y="1143000"/>
+            <a:ext cx="6858001" cy="6858000"/>
+          </a:xfrm>
+          <a:prstGeom prst="rect">
+            <a:avLst/>
+          </a:prstGeom>
+          <a:noFill/>
+          <a:extLst>
+            <a:ext uri="{909E8E84-426E-40DD-AFC4-6F175D3DCCD1}">
+              <a14:hiddenFill xmlns:a14="http://schemas.microsoft.com/office/drawing/2010/main">
+                <a:solidFill>
+                  <a:srgbClr val="FFFFFF"/>
+                </a:solidFill>
+              </a14:hiddenFill>
+            </a:ext>
+          </a:extLst>
+        </p:spPr>
+      </p:pic>
+      <p:sp>
+        <p:nvSpPr>
+          <p:cNvPr id="4" name="Rectangle 3"/>
+          <p:cNvSpPr/>
+          <p:nvPr/>
+        </p:nvSpPr>
+        <p:spPr>
+          <a:xfrm>
+            <a:off x="2647660" y="3787170"/>
+            <a:ext cx="1562681" cy="1569660"/>
+          </a:xfrm>
+          <a:prstGeom prst="rect">
+            <a:avLst/>
+          </a:prstGeom>
+          <a:noFill/>
+        </p:spPr>
+        <p:txBody>
+          <a:bodyPr wrap="square" lIns="91440" tIns="45720" rIns="91440" bIns="45720">
+            <a:spAutoFit/>
+          </a:bodyPr>
+          <a:lstStyle/>
+          <a:p>
+            <a:pPr algn="ctr"/>
+            <a:r>
+              <a:rPr lang="en-US" sz="9600" b="1" cap="none" spc="0" dirty="0" smtClean="0">
+                <a:ln w="12700">
+                  <a:solidFill>
+                    <a:schemeClr val="tx2">
+                      <a:satMod val="155000"/>
+                    </a:schemeClr>
+                  </a:solidFill>
+                  <a:prstDash val="solid"/>
+                </a:ln>
+                <a:solidFill>
+                  <a:schemeClr val="bg2">
+                    <a:tint val="85000"/>
+                    <a:satMod val="155000"/>
+                  </a:schemeClr>
+                </a:solidFill>
+                <a:effectLst>
+                  <a:outerShdw blurRad="41275" dist="20320" dir="1800000" algn="tl" rotWithShape="0">
+                    <a:srgbClr val="000000">
+                      <a:alpha val="40000"/>
+                    </a:srgbClr>
+                  </a:outerShdw>
+                </a:effectLst>
+              </a:rPr>
+              <a:t>10</a:t>
+            </a:r>
+            <a:endParaRPr lang="en-US" sz="9600" b="1" cap="none" spc="0" dirty="0">
+              <a:ln w="12700">
+                <a:solidFill>
+                  <a:schemeClr val="tx2">
+                    <a:satMod val="155000"/>
+                  </a:schemeClr>
+                </a:solidFill>
+                <a:prstDash val="solid"/>
+              </a:ln>
+              <a:solidFill>
+                <a:schemeClr val="bg2">
+                  <a:tint val="85000"/>
+                  <a:satMod val="155000"/>
+                </a:schemeClr>
+              </a:solidFill>
+              <a:effectLst>
+                <a:outerShdw blurRad="41275" dist="20320" dir="1800000" algn="tl" rotWithShape="0">
+                  <a:srgbClr val="000000">
+                    <a:alpha val="40000"/>
+                  </a:srgbClr>
+                </a:outerShdw>
+              </a:effectLst>
+            </a:endParaRPr>
+          </a:p>
+        </p:txBody>
+      </p:sp>
+      <p:sp>
+        <p:nvSpPr>
+          <p:cNvPr id="5" name="Isosceles Triangle 4"/>
+          <p:cNvSpPr/>
+          <p:nvPr/>
+        </p:nvSpPr>
+        <p:spPr>
+          <a:xfrm>
+            <a:off x="3028950" y="0"/>
+            <a:ext cx="800100" cy="190500"/>
+          </a:xfrm>
+          <a:prstGeom prst="triangle">
+            <a:avLst/>
+          </a:prstGeom>
+        </p:spPr>
+        <p:style>
+          <a:lnRef idx="2">
+            <a:schemeClr val="accent1">
+              <a:shade val="50000"/>
+            </a:schemeClr>
+          </a:lnRef>
+          <a:fillRef idx="1">
+            <a:schemeClr val="accent1"/>
+          </a:fillRef>
+          <a:effectRef idx="0">
+            <a:schemeClr val="accent1"/>
+          </a:effectRef>
+          <a:fontRef idx="minor">
+            <a:schemeClr val="lt1"/>
+          </a:fontRef>
+        </p:style>
+        <p:txBody>
+          <a:bodyPr rtlCol="0" anchor="ctr"/>
+          <a:lstStyle/>
+          <a:p>
+            <a:pPr algn="ctr"/>
+            <a:endParaRPr lang="en-US"/>
+          </a:p>
+        </p:txBody>
+      </p:sp>
+    </p:spTree>
+    <p:extLst>
+      <p:ext uri="{BB962C8B-B14F-4D97-AF65-F5344CB8AC3E}">
+        <p14:creationId xmlns:p14="http://schemas.microsoft.com/office/powerpoint/2010/main" val="1139947112"/>
+      </p:ext>
+    </p:extLst>
+  </p:cSld>
+  <p:clrMapOvr>
+    <a:masterClrMapping/>
+  </p:clrMapOvr>
+</p:sld>
+</file>
+
+<file path=ppt/slides/slide12.xml><?xml version="1.0" encoding="utf-8"?>
+<p:sld xmlns:a="http://schemas.openxmlformats.org/drawingml/2006/main" xmlns:r="http://schemas.openxmlformats.org/officeDocument/2006/relationships" xmlns:p="http://schemas.openxmlformats.org/presentationml/2006/main">
+  <p:cSld>
+    <p:spTree>
+      <p:nvGrpSpPr>
+        <p:cNvPr id="1" name=""/>
+        <p:cNvGrpSpPr/>
+        <p:nvPr/>
+      </p:nvGrpSpPr>
+      <p:grpSpPr>
+        <a:xfrm>
+          <a:off x="0" y="0"/>
+          <a:ext cx="0" cy="0"/>
+          <a:chOff x="0" y="0"/>
+          <a:chExt cx="0" cy="0"/>
+        </a:xfrm>
+      </p:grpSpPr>
+      <p:pic>
+        <p:nvPicPr>
+          <p:cNvPr id="13314" name="Picture 2" descr="C:\Users\tom\Documents\frameMarkers\frameMarker_012.png"/>
+          <p:cNvPicPr>
+            <a:picLocks noChangeAspect="1" noChangeArrowheads="1"/>
+          </p:cNvPicPr>
+          <p:nvPr/>
+        </p:nvPicPr>
+        <p:blipFill>
+          <a:blip r:embed="rId2">
+            <a:extLst>
+              <a:ext uri="{28A0092B-C50C-407E-A947-70E740481C1C}">
+                <a14:useLocalDpi xmlns:a14="http://schemas.microsoft.com/office/drawing/2010/main" val="0"/>
+              </a:ext>
+            </a:extLst>
+          </a:blip>
+          <a:srcRect/>
+          <a:stretch>
+            <a:fillRect/>
+          </a:stretch>
+        </p:blipFill>
+        <p:spPr bwMode="auto">
+          <a:xfrm>
+            <a:off x="0" y="1143000"/>
+            <a:ext cx="6858000" cy="6858000"/>
+          </a:xfrm>
+          <a:prstGeom prst="rect">
+            <a:avLst/>
+          </a:prstGeom>
+          <a:noFill/>
+          <a:extLst>
+            <a:ext uri="{909E8E84-426E-40DD-AFC4-6F175D3DCCD1}">
+              <a14:hiddenFill xmlns:a14="http://schemas.microsoft.com/office/drawing/2010/main">
+                <a:solidFill>
+                  <a:srgbClr val="FFFFFF"/>
+                </a:solidFill>
+              </a14:hiddenFill>
+            </a:ext>
+          </a:extLst>
+        </p:spPr>
+      </p:pic>
+      <p:sp>
+        <p:nvSpPr>
+          <p:cNvPr id="5" name="Rectangle 4"/>
+          <p:cNvSpPr/>
+          <p:nvPr/>
+        </p:nvSpPr>
+        <p:spPr>
+          <a:xfrm>
+            <a:off x="2647660" y="3787170"/>
+            <a:ext cx="1562681" cy="1569660"/>
+          </a:xfrm>
+          <a:prstGeom prst="rect">
+            <a:avLst/>
+          </a:prstGeom>
+          <a:noFill/>
+        </p:spPr>
+        <p:txBody>
+          <a:bodyPr wrap="square" lIns="91440" tIns="45720" rIns="91440" bIns="45720">
+            <a:spAutoFit/>
+          </a:bodyPr>
+          <a:lstStyle/>
+          <a:p>
+            <a:pPr algn="ctr"/>
+            <a:r>
+              <a:rPr lang="en-US" sz="9600" b="1" cap="none" spc="0" dirty="0" smtClean="0">
+                <a:ln w="12700">
+                  <a:solidFill>
+                    <a:schemeClr val="tx2">
+                      <a:satMod val="155000"/>
+                    </a:schemeClr>
+                  </a:solidFill>
+                  <a:prstDash val="solid"/>
+                </a:ln>
+                <a:solidFill>
+                  <a:schemeClr val="bg2">
+                    <a:tint val="85000"/>
+                    <a:satMod val="155000"/>
+                  </a:schemeClr>
+                </a:solidFill>
+                <a:effectLst>
+                  <a:outerShdw blurRad="41275" dist="20320" dir="1800000" algn="tl" rotWithShape="0">
+                    <a:srgbClr val="000000">
+                      <a:alpha val="40000"/>
+                    </a:srgbClr>
+                  </a:outerShdw>
+                </a:effectLst>
+              </a:rPr>
+              <a:t>11</a:t>
+            </a:r>
+            <a:endParaRPr lang="en-US" sz="9600" b="1" cap="none" spc="0" dirty="0">
+              <a:ln w="12700">
+                <a:solidFill>
+                  <a:schemeClr val="tx2">
+                    <a:satMod val="155000"/>
+                  </a:schemeClr>
+                </a:solidFill>
+                <a:prstDash val="solid"/>
+              </a:ln>
+              <a:solidFill>
+                <a:schemeClr val="bg2">
+                  <a:tint val="85000"/>
+                  <a:satMod val="155000"/>
+                </a:schemeClr>
+              </a:solidFill>
+              <a:effectLst>
+                <a:outerShdw blurRad="41275" dist="20320" dir="1800000" algn="tl" rotWithShape="0">
+                  <a:srgbClr val="000000">
+                    <a:alpha val="40000"/>
+                  </a:srgbClr>
+                </a:outerShdw>
+              </a:effectLst>
+            </a:endParaRPr>
+          </a:p>
+        </p:txBody>
+      </p:sp>
+      <p:sp>
+        <p:nvSpPr>
+          <p:cNvPr id="6" name="Isosceles Triangle 5"/>
+          <p:cNvSpPr/>
+          <p:nvPr/>
+        </p:nvSpPr>
+        <p:spPr>
+          <a:xfrm>
+            <a:off x="3028950" y="0"/>
+            <a:ext cx="800100" cy="190500"/>
+          </a:xfrm>
+          <a:prstGeom prst="triangle">
+            <a:avLst/>
+          </a:prstGeom>
+        </p:spPr>
+        <p:style>
+          <a:lnRef idx="2">
+            <a:schemeClr val="accent1">
+              <a:shade val="50000"/>
+            </a:schemeClr>
+          </a:lnRef>
+          <a:fillRef idx="1">
+            <a:schemeClr val="accent1"/>
+          </a:fillRef>
+          <a:effectRef idx="0">
+            <a:schemeClr val="accent1"/>
+          </a:effectRef>
+          <a:fontRef idx="minor">
+            <a:schemeClr val="lt1"/>
+          </a:fontRef>
+        </p:style>
+        <p:txBody>
+          <a:bodyPr rtlCol="0" anchor="ctr"/>
+          <a:lstStyle/>
+          <a:p>
+            <a:pPr algn="ctr"/>
+            <a:endParaRPr lang="en-US"/>
+          </a:p>
+        </p:txBody>
+      </p:sp>
+    </p:spTree>
+    <p:extLst>
+      <p:ext uri="{BB962C8B-B14F-4D97-AF65-F5344CB8AC3E}">
+        <p14:creationId xmlns:p14="http://schemas.microsoft.com/office/powerpoint/2010/main" val="1139947112"/>
+      </p:ext>
+    </p:extLst>
+  </p:cSld>
+  <p:clrMapOvr>
+    <a:masterClrMapping/>
+  </p:clrMapOvr>
+</p:sld>
+</file>
+
+<file path=ppt/slides/slide13.xml><?xml version="1.0" encoding="utf-8"?>
+<p:sld xmlns:a="http://schemas.openxmlformats.org/drawingml/2006/main" xmlns:r="http://schemas.openxmlformats.org/officeDocument/2006/relationships" xmlns:p="http://schemas.openxmlformats.org/presentationml/2006/main">
+  <p:cSld>
+    <p:spTree>
+      <p:nvGrpSpPr>
+        <p:cNvPr id="1" name=""/>
+        <p:cNvGrpSpPr/>
+        <p:nvPr/>
+      </p:nvGrpSpPr>
+      <p:grpSpPr>
+        <a:xfrm>
+          <a:off x="0" y="0"/>
+          <a:ext cx="0" cy="0"/>
+          <a:chOff x="0" y="0"/>
+          <a:chExt cx="0" cy="0"/>
+        </a:xfrm>
+      </p:grpSpPr>
+      <p:pic>
+        <p:nvPicPr>
+          <p:cNvPr id="14338" name="Picture 2" descr="C:\Users\tom\Documents\frameMarkers\frameMarker_013.png"/>
+          <p:cNvPicPr>
+            <a:picLocks noChangeAspect="1" noChangeArrowheads="1"/>
+          </p:cNvPicPr>
+          <p:nvPr/>
+        </p:nvPicPr>
+        <p:blipFill>
+          <a:blip r:embed="rId2">
+            <a:extLst>
+              <a:ext uri="{28A0092B-C50C-407E-A947-70E740481C1C}">
+                <a14:useLocalDpi xmlns:a14="http://schemas.microsoft.com/office/drawing/2010/main" val="0"/>
+              </a:ext>
+            </a:extLst>
+          </a:blip>
+          <a:srcRect/>
+          <a:stretch>
+            <a:fillRect/>
+          </a:stretch>
+        </p:blipFill>
+        <p:spPr bwMode="auto">
+          <a:xfrm>
+            <a:off x="0" y="1143000"/>
+            <a:ext cx="6858000" cy="6858000"/>
+          </a:xfrm>
+          <a:prstGeom prst="rect">
+            <a:avLst/>
+          </a:prstGeom>
+          <a:noFill/>
+          <a:extLst>
+            <a:ext uri="{909E8E84-426E-40DD-AFC4-6F175D3DCCD1}">
+              <a14:hiddenFill xmlns:a14="http://schemas.microsoft.com/office/drawing/2010/main">
+                <a:solidFill>
+                  <a:srgbClr val="FFFFFF"/>
+                </a:solidFill>
+              </a14:hiddenFill>
+            </a:ext>
+          </a:extLst>
+        </p:spPr>
+      </p:pic>
+      <p:sp>
+        <p:nvSpPr>
+          <p:cNvPr id="5" name="Rectangle 4"/>
+          <p:cNvSpPr/>
+          <p:nvPr/>
+        </p:nvSpPr>
+        <p:spPr>
+          <a:xfrm>
+            <a:off x="2647660" y="3787170"/>
+            <a:ext cx="1562681" cy="1569660"/>
+          </a:xfrm>
+          <a:prstGeom prst="rect">
+            <a:avLst/>
+          </a:prstGeom>
+          <a:noFill/>
+        </p:spPr>
+        <p:txBody>
+          <a:bodyPr wrap="square" lIns="91440" tIns="45720" rIns="91440" bIns="45720">
+            <a:spAutoFit/>
+          </a:bodyPr>
+          <a:lstStyle/>
+          <a:p>
+            <a:pPr algn="ctr"/>
+            <a:r>
+              <a:rPr lang="en-US" sz="9600" b="1" dirty="0" smtClean="0">
+                <a:ln w="12700">
+                  <a:solidFill>
+                    <a:schemeClr val="tx2">
+                      <a:satMod val="155000"/>
+                    </a:schemeClr>
+                  </a:solidFill>
+                  <a:prstDash val="solid"/>
+                </a:ln>
+                <a:solidFill>
+                  <a:schemeClr val="bg2">
+                    <a:tint val="85000"/>
+                    <a:satMod val="155000"/>
+                  </a:schemeClr>
+                </a:solidFill>
+                <a:effectLst>
+                  <a:outerShdw blurRad="41275" dist="20320" dir="1800000" algn="tl" rotWithShape="0">
+                    <a:srgbClr val="000000">
+                      <a:alpha val="40000"/>
+                    </a:srgbClr>
+                  </a:outerShdw>
+                </a:effectLst>
+              </a:rPr>
+              <a:t>12</a:t>
+            </a:r>
+            <a:endParaRPr lang="en-US" sz="9600" b="1" cap="none" spc="0" dirty="0">
+              <a:ln w="12700">
+                <a:solidFill>
+                  <a:schemeClr val="tx2">
+                    <a:satMod val="155000"/>
+                  </a:schemeClr>
+                </a:solidFill>
+                <a:prstDash val="solid"/>
+              </a:ln>
+              <a:solidFill>
+                <a:schemeClr val="bg2">
+                  <a:tint val="85000"/>
+                  <a:satMod val="155000"/>
+                </a:schemeClr>
+              </a:solidFill>
+              <a:effectLst>
+                <a:outerShdw blurRad="41275" dist="20320" dir="1800000" algn="tl" rotWithShape="0">
+                  <a:srgbClr val="000000">
+                    <a:alpha val="40000"/>
+                  </a:srgbClr>
+                </a:outerShdw>
+              </a:effectLst>
+            </a:endParaRPr>
+          </a:p>
+        </p:txBody>
+      </p:sp>
+      <p:sp>
+        <p:nvSpPr>
+          <p:cNvPr id="6" name="Isosceles Triangle 5"/>
+          <p:cNvSpPr/>
+          <p:nvPr/>
+        </p:nvSpPr>
+        <p:spPr>
+          <a:xfrm>
+            <a:off x="3028950" y="0"/>
+            <a:ext cx="800100" cy="190500"/>
+          </a:xfrm>
+          <a:prstGeom prst="triangle">
+            <a:avLst/>
+          </a:prstGeom>
+        </p:spPr>
+        <p:style>
+          <a:lnRef idx="2">
+            <a:schemeClr val="accent1">
+              <a:shade val="50000"/>
+            </a:schemeClr>
+          </a:lnRef>
+          <a:fillRef idx="1">
+            <a:schemeClr val="accent1"/>
+          </a:fillRef>
+          <a:effectRef idx="0">
+            <a:schemeClr val="accent1"/>
+          </a:effectRef>
+          <a:fontRef idx="minor">
+            <a:schemeClr val="lt1"/>
+          </a:fontRef>
+        </p:style>
+        <p:txBody>
+          <a:bodyPr rtlCol="0" anchor="ctr"/>
+          <a:lstStyle/>
+          <a:p>
+            <a:pPr algn="ctr"/>
+            <a:endParaRPr lang="en-US"/>
+          </a:p>
+        </p:txBody>
+      </p:sp>
+    </p:spTree>
+    <p:extLst>
+      <p:ext uri="{BB962C8B-B14F-4D97-AF65-F5344CB8AC3E}">
+        <p14:creationId xmlns:p14="http://schemas.microsoft.com/office/powerpoint/2010/main" val="1139947112"/>
+      </p:ext>
+    </p:extLst>
+  </p:cSld>
+  <p:clrMapOvr>
+    <a:masterClrMapping/>
+  </p:clrMapOvr>
+</p:sld>
+</file>
+
+<file path=ppt/slides/slide14.xml><?xml version="1.0" encoding="utf-8"?>
+<p:sld xmlns:a="http://schemas.openxmlformats.org/drawingml/2006/main" xmlns:r="http://schemas.openxmlformats.org/officeDocument/2006/relationships" xmlns:p="http://schemas.openxmlformats.org/presentationml/2006/main">
+  <p:cSld>
+    <p:spTree>
+      <p:nvGrpSpPr>
+        <p:cNvPr id="1" name=""/>
+        <p:cNvGrpSpPr/>
+        <p:nvPr/>
+      </p:nvGrpSpPr>
+      <p:grpSpPr>
+        <a:xfrm>
+          <a:off x="0" y="0"/>
+          <a:ext cx="0" cy="0"/>
+          <a:chOff x="0" y="0"/>
+          <a:chExt cx="0" cy="0"/>
+        </a:xfrm>
+      </p:grpSpPr>
+      <p:pic>
+        <p:nvPicPr>
+          <p:cNvPr id="15362" name="Picture 2" descr="C:\Users\tom\Documents\frameMarkers\frameMarker_014.png"/>
+          <p:cNvPicPr>
+            <a:picLocks noChangeAspect="1" noChangeArrowheads="1"/>
+          </p:cNvPicPr>
+          <p:nvPr/>
+        </p:nvPicPr>
+        <p:blipFill>
+          <a:blip r:embed="rId2">
+            <a:extLst>
+              <a:ext uri="{28A0092B-C50C-407E-A947-70E740481C1C}">
+                <a14:useLocalDpi xmlns:a14="http://schemas.microsoft.com/office/drawing/2010/main" val="0"/>
+              </a:ext>
+            </a:extLst>
+          </a:blip>
+          <a:srcRect/>
+          <a:stretch>
+            <a:fillRect/>
+          </a:stretch>
+        </p:blipFill>
+        <p:spPr bwMode="auto">
+          <a:xfrm>
+            <a:off x="0" y="1143000"/>
+            <a:ext cx="6858001" cy="6858000"/>
+          </a:xfrm>
+          <a:prstGeom prst="rect">
+            <a:avLst/>
+          </a:prstGeom>
+          <a:noFill/>
+          <a:extLst>
+            <a:ext uri="{909E8E84-426E-40DD-AFC4-6F175D3DCCD1}">
+              <a14:hiddenFill xmlns:a14="http://schemas.microsoft.com/office/drawing/2010/main">
+                <a:solidFill>
+                  <a:srgbClr val="FFFFFF"/>
+                </a:solidFill>
+              </a14:hiddenFill>
+            </a:ext>
+          </a:extLst>
+        </p:spPr>
+      </p:pic>
+      <p:sp>
+        <p:nvSpPr>
+          <p:cNvPr id="5" name="Rectangle 4"/>
+          <p:cNvSpPr/>
+          <p:nvPr/>
+        </p:nvSpPr>
+        <p:spPr>
+          <a:xfrm>
+            <a:off x="2647660" y="3787170"/>
+            <a:ext cx="1562681" cy="1569660"/>
+          </a:xfrm>
+          <a:prstGeom prst="rect">
+            <a:avLst/>
+          </a:prstGeom>
+          <a:noFill/>
+        </p:spPr>
+        <p:txBody>
+          <a:bodyPr wrap="square" lIns="91440" tIns="45720" rIns="91440" bIns="45720">
+            <a:spAutoFit/>
+          </a:bodyPr>
+          <a:lstStyle/>
+          <a:p>
+            <a:pPr algn="ctr"/>
+            <a:r>
+              <a:rPr lang="en-US" sz="9600" b="1" cap="none" spc="0" dirty="0" smtClean="0">
+                <a:ln w="12700">
+                  <a:solidFill>
+                    <a:schemeClr val="tx2">
+                      <a:satMod val="155000"/>
+                    </a:schemeClr>
+                  </a:solidFill>
+                  <a:prstDash val="solid"/>
+                </a:ln>
+                <a:solidFill>
+                  <a:schemeClr val="bg2">
+                    <a:tint val="85000"/>
+                    <a:satMod val="155000"/>
+                  </a:schemeClr>
+                </a:solidFill>
+                <a:effectLst>
+                  <a:outerShdw blurRad="41275" dist="20320" dir="1800000" algn="tl" rotWithShape="0">
+                    <a:srgbClr val="000000">
+                      <a:alpha val="40000"/>
+                    </a:srgbClr>
+                  </a:outerShdw>
+                </a:effectLst>
+              </a:rPr>
+              <a:t>13</a:t>
+            </a:r>
+            <a:endParaRPr lang="en-US" sz="9600" b="1" cap="none" spc="0" dirty="0">
+              <a:ln w="12700">
+                <a:solidFill>
+                  <a:schemeClr val="tx2">
+                    <a:satMod val="155000"/>
+                  </a:schemeClr>
+                </a:solidFill>
+                <a:prstDash val="solid"/>
+              </a:ln>
+              <a:solidFill>
+                <a:schemeClr val="bg2">
+                  <a:tint val="85000"/>
+                  <a:satMod val="155000"/>
+                </a:schemeClr>
+              </a:solidFill>
+              <a:effectLst>
+                <a:outerShdw blurRad="41275" dist="20320" dir="1800000" algn="tl" rotWithShape="0">
+                  <a:srgbClr val="000000">
+                    <a:alpha val="40000"/>
+                  </a:srgbClr>
+                </a:outerShdw>
+              </a:effectLst>
+            </a:endParaRPr>
+          </a:p>
+        </p:txBody>
+      </p:sp>
+      <p:sp>
+        <p:nvSpPr>
+          <p:cNvPr id="6" name="Isosceles Triangle 5"/>
+          <p:cNvSpPr/>
+          <p:nvPr/>
+        </p:nvSpPr>
+        <p:spPr>
+          <a:xfrm>
+            <a:off x="3028950" y="0"/>
+            <a:ext cx="800100" cy="190500"/>
+          </a:xfrm>
+          <a:prstGeom prst="triangle">
+            <a:avLst/>
+          </a:prstGeom>
+        </p:spPr>
+        <p:style>
+          <a:lnRef idx="2">
+            <a:schemeClr val="accent1">
+              <a:shade val="50000"/>
+            </a:schemeClr>
+          </a:lnRef>
+          <a:fillRef idx="1">
+            <a:schemeClr val="accent1"/>
+          </a:fillRef>
+          <a:effectRef idx="0">
+            <a:schemeClr val="accent1"/>
+          </a:effectRef>
+          <a:fontRef idx="minor">
+            <a:schemeClr val="lt1"/>
+          </a:fontRef>
+        </p:style>
+        <p:txBody>
+          <a:bodyPr rtlCol="0" anchor="ctr"/>
+          <a:lstStyle/>
+          <a:p>
+            <a:pPr algn="ctr"/>
+            <a:endParaRPr lang="en-US"/>
+          </a:p>
+        </p:txBody>
+      </p:sp>
+    </p:spTree>
+    <p:extLst>
+      <p:ext uri="{BB962C8B-B14F-4D97-AF65-F5344CB8AC3E}">
+        <p14:creationId xmlns:p14="http://schemas.microsoft.com/office/powerpoint/2010/main" val="1139947112"/>
+      </p:ext>
+    </p:extLst>
+  </p:cSld>
+  <p:clrMapOvr>
+    <a:masterClrMapping/>
+  </p:clrMapOvr>
+</p:sld>
+</file>
+
+<file path=ppt/slides/slide15.xml><?xml version="1.0" encoding="utf-8"?>
+<p:sld xmlns:a="http://schemas.openxmlformats.org/drawingml/2006/main" xmlns:r="http://schemas.openxmlformats.org/officeDocument/2006/relationships" xmlns:p="http://schemas.openxmlformats.org/presentationml/2006/main">
+  <p:cSld>
+    <p:spTree>
+      <p:nvGrpSpPr>
+        <p:cNvPr id="1" name=""/>
+        <p:cNvGrpSpPr/>
+        <p:nvPr/>
+      </p:nvGrpSpPr>
+      <p:grpSpPr>
+        <a:xfrm>
+          <a:off x="0" y="0"/>
+          <a:ext cx="0" cy="0"/>
+          <a:chOff x="0" y="0"/>
+          <a:chExt cx="0" cy="0"/>
+        </a:xfrm>
+      </p:grpSpPr>
+      <p:pic>
+        <p:nvPicPr>
+          <p:cNvPr id="16386" name="Picture 2" descr="C:\Users\tom\Documents\frameMarkers\frameMarker_015.png"/>
+          <p:cNvPicPr>
+            <a:picLocks noChangeAspect="1" noChangeArrowheads="1"/>
+          </p:cNvPicPr>
+          <p:nvPr/>
+        </p:nvPicPr>
+        <p:blipFill>
+          <a:blip r:embed="rId2">
+            <a:extLst>
+              <a:ext uri="{28A0092B-C50C-407E-A947-70E740481C1C}">
+                <a14:useLocalDpi xmlns:a14="http://schemas.microsoft.com/office/drawing/2010/main" val="0"/>
+              </a:ext>
+            </a:extLst>
+          </a:blip>
+          <a:srcRect/>
+          <a:stretch>
+            <a:fillRect/>
+          </a:stretch>
+        </p:blipFill>
+        <p:spPr bwMode="auto">
+          <a:xfrm>
+            <a:off x="0" y="1143000"/>
+            <a:ext cx="6858000" cy="6858000"/>
+          </a:xfrm>
+          <a:prstGeom prst="rect">
+            <a:avLst/>
+          </a:prstGeom>
+          <a:noFill/>
+          <a:extLst>
+            <a:ext uri="{909E8E84-426E-40DD-AFC4-6F175D3DCCD1}">
+              <a14:hiddenFill xmlns:a14="http://schemas.microsoft.com/office/drawing/2010/main">
+                <a:solidFill>
+                  <a:srgbClr val="FFFFFF"/>
+                </a:solidFill>
+              </a14:hiddenFill>
+            </a:ext>
+          </a:extLst>
+        </p:spPr>
+      </p:pic>
+      <p:sp>
+        <p:nvSpPr>
+          <p:cNvPr id="5" name="Rectangle 4"/>
+          <p:cNvSpPr/>
+          <p:nvPr/>
+        </p:nvSpPr>
+        <p:spPr>
+          <a:xfrm>
+            <a:off x="2647660" y="3787170"/>
+            <a:ext cx="1562681" cy="1569660"/>
+          </a:xfrm>
+          <a:prstGeom prst="rect">
+            <a:avLst/>
+          </a:prstGeom>
+          <a:noFill/>
+        </p:spPr>
+        <p:txBody>
+          <a:bodyPr wrap="square" lIns="91440" tIns="45720" rIns="91440" bIns="45720">
+            <a:spAutoFit/>
+          </a:bodyPr>
+          <a:lstStyle/>
+          <a:p>
+            <a:pPr algn="ctr"/>
+            <a:r>
+              <a:rPr lang="en-US" sz="9600" b="1" cap="none" spc="0" dirty="0" smtClean="0">
+                <a:ln w="12700">
+                  <a:solidFill>
+                    <a:schemeClr val="tx2">
+                      <a:satMod val="155000"/>
+                    </a:schemeClr>
+                  </a:solidFill>
+                  <a:prstDash val="solid"/>
+                </a:ln>
+                <a:solidFill>
+                  <a:schemeClr val="bg2">
+                    <a:tint val="85000"/>
+                    <a:satMod val="155000"/>
+                  </a:schemeClr>
+                </a:solidFill>
+                <a:effectLst>
+                  <a:outerShdw blurRad="41275" dist="20320" dir="1800000" algn="tl" rotWithShape="0">
+                    <a:srgbClr val="000000">
+                      <a:alpha val="40000"/>
+                    </a:srgbClr>
+                  </a:outerShdw>
+                </a:effectLst>
+              </a:rPr>
+              <a:t>14</a:t>
+            </a:r>
+            <a:endParaRPr lang="en-US" sz="9600" b="1" cap="none" spc="0" dirty="0">
+              <a:ln w="12700">
+                <a:solidFill>
+                  <a:schemeClr val="tx2">
+                    <a:satMod val="155000"/>
+                  </a:schemeClr>
+                </a:solidFill>
+                <a:prstDash val="solid"/>
+              </a:ln>
+              <a:solidFill>
+                <a:schemeClr val="bg2">
+                  <a:tint val="85000"/>
+                  <a:satMod val="155000"/>
+                </a:schemeClr>
+              </a:solidFill>
+              <a:effectLst>
+                <a:outerShdw blurRad="41275" dist="20320" dir="1800000" algn="tl" rotWithShape="0">
+                  <a:srgbClr val="000000">
+                    <a:alpha val="40000"/>
+                  </a:srgbClr>
+                </a:outerShdw>
+              </a:effectLst>
+            </a:endParaRPr>
+          </a:p>
+        </p:txBody>
+      </p:sp>
+      <p:sp>
+        <p:nvSpPr>
+          <p:cNvPr id="6" name="Isosceles Triangle 5"/>
+          <p:cNvSpPr/>
+          <p:nvPr/>
+        </p:nvSpPr>
+        <p:spPr>
+          <a:xfrm>
+            <a:off x="3028950" y="0"/>
+            <a:ext cx="800100" cy="190500"/>
+          </a:xfrm>
+          <a:prstGeom prst="triangle">
+            <a:avLst/>
+          </a:prstGeom>
+        </p:spPr>
+        <p:style>
+          <a:lnRef idx="2">
+            <a:schemeClr val="accent1">
+              <a:shade val="50000"/>
+            </a:schemeClr>
+          </a:lnRef>
+          <a:fillRef idx="1">
+            <a:schemeClr val="accent1"/>
+          </a:fillRef>
+          <a:effectRef idx="0">
+            <a:schemeClr val="accent1"/>
+          </a:effectRef>
+          <a:fontRef idx="minor">
+            <a:schemeClr val="lt1"/>
+          </a:fontRef>
+        </p:style>
+        <p:txBody>
+          <a:bodyPr rtlCol="0" anchor="ctr"/>
+          <a:lstStyle/>
+          <a:p>
+            <a:pPr algn="ctr"/>
+            <a:endParaRPr lang="en-US"/>
+          </a:p>
+        </p:txBody>
+      </p:sp>
+    </p:spTree>
+    <p:extLst>
+      <p:ext uri="{BB962C8B-B14F-4D97-AF65-F5344CB8AC3E}">
+        <p14:creationId xmlns:p14="http://schemas.microsoft.com/office/powerpoint/2010/main" val="1139947112"/>
+      </p:ext>
+    </p:extLst>
+  </p:cSld>
+  <p:clrMapOvr>
+    <a:masterClrMapping/>
+  </p:clrMapOvr>
+</p:sld>
+</file>
+
+<file path=ppt/slides/slide16.xml><?xml version="1.0" encoding="utf-8"?>
+<p:sld xmlns:a="http://schemas.openxmlformats.org/drawingml/2006/main" xmlns:r="http://schemas.openxmlformats.org/officeDocument/2006/relationships" xmlns:p="http://schemas.openxmlformats.org/presentationml/2006/main">
+  <p:cSld>
+    <p:spTree>
+      <p:nvGrpSpPr>
+        <p:cNvPr id="1" name=""/>
+        <p:cNvGrpSpPr/>
+        <p:nvPr/>
+      </p:nvGrpSpPr>
+      <p:grpSpPr>
+        <a:xfrm>
+          <a:off x="0" y="0"/>
+          <a:ext cx="0" cy="0"/>
+          <a:chOff x="0" y="0"/>
+          <a:chExt cx="0" cy="0"/>
+        </a:xfrm>
+      </p:grpSpPr>
+      <p:pic>
+        <p:nvPicPr>
+          <p:cNvPr id="9218" name="Picture 2" descr="C:\Users\tom\Documents\frameMarkers\frameMarker_008.png"/>
+          <p:cNvPicPr>
+            <a:picLocks noChangeAspect="1" noChangeArrowheads="1"/>
+          </p:cNvPicPr>
+          <p:nvPr/>
+        </p:nvPicPr>
+        <p:blipFill>
+          <a:blip r:embed="rId2">
+            <a:extLst>
+              <a:ext uri="{28A0092B-C50C-407E-A947-70E740481C1C}">
+                <a14:useLocalDpi xmlns:a14="http://schemas.microsoft.com/office/drawing/2010/main" val="0"/>
+              </a:ext>
+            </a:extLst>
+          </a:blip>
+          <a:srcRect/>
+          <a:stretch>
+            <a:fillRect/>
+          </a:stretch>
+        </p:blipFill>
+        <p:spPr bwMode="auto">
+          <a:xfrm>
+            <a:off x="0" y="1143000"/>
+            <a:ext cx="6858000" cy="6858000"/>
+          </a:xfrm>
+          <a:prstGeom prst="rect">
+            <a:avLst/>
+          </a:prstGeom>
+          <a:noFill/>
+          <a:extLst>
+            <a:ext uri="{909E8E84-426E-40DD-AFC4-6F175D3DCCD1}">
+              <a14:hiddenFill xmlns:a14="http://schemas.microsoft.com/office/drawing/2010/main">
+                <a:solidFill>
+                  <a:srgbClr val="FFFFFF"/>
+                </a:solidFill>
+              </a14:hiddenFill>
+            </a:ext>
+          </a:extLst>
+        </p:spPr>
+      </p:pic>
+      <p:sp>
+        <p:nvSpPr>
+          <p:cNvPr id="5" name="Rectangle 4"/>
+          <p:cNvSpPr/>
+          <p:nvPr/>
+        </p:nvSpPr>
+        <p:spPr>
+          <a:xfrm>
+            <a:off x="2647660" y="3787170"/>
+            <a:ext cx="1562681" cy="1569660"/>
+          </a:xfrm>
+          <a:prstGeom prst="rect">
+            <a:avLst/>
+          </a:prstGeom>
+          <a:noFill/>
+        </p:spPr>
+        <p:txBody>
+          <a:bodyPr wrap="square" lIns="91440" tIns="45720" rIns="91440" bIns="45720">
+            <a:spAutoFit/>
+          </a:bodyPr>
+          <a:lstStyle/>
+          <a:p>
+            <a:pPr algn="ctr"/>
+            <a:r>
+              <a:rPr lang="en-US" sz="9600" b="1" cap="none" spc="0" dirty="0" smtClean="0">
+                <a:ln w="12700">
+                  <a:solidFill>
+                    <a:schemeClr val="tx2">
+                      <a:satMod val="155000"/>
+                    </a:schemeClr>
+                  </a:solidFill>
+                  <a:prstDash val="solid"/>
+                </a:ln>
+                <a:solidFill>
+                  <a:schemeClr val="bg2">
+                    <a:tint val="85000"/>
+                    <a:satMod val="155000"/>
+                  </a:schemeClr>
+                </a:solidFill>
+                <a:effectLst>
+                  <a:outerShdw blurRad="41275" dist="20320" dir="1800000" algn="tl" rotWithShape="0">
+                    <a:srgbClr val="000000">
+                      <a:alpha val="40000"/>
+                    </a:srgbClr>
+                  </a:outerShdw>
+                </a:effectLst>
+              </a:rPr>
+              <a:t>15</a:t>
+            </a:r>
+            <a:endParaRPr lang="en-US" sz="9600" b="1" cap="none" spc="0" dirty="0">
+              <a:ln w="12700">
+                <a:solidFill>
+                  <a:schemeClr val="tx2">
+                    <a:satMod val="155000"/>
+                  </a:schemeClr>
+                </a:solidFill>
+                <a:prstDash val="solid"/>
+              </a:ln>
+              <a:solidFill>
+                <a:schemeClr val="bg2">
+                  <a:tint val="85000"/>
+                  <a:satMod val="155000"/>
+                </a:schemeClr>
+              </a:solidFill>
+              <a:effectLst>
+                <a:outerShdw blurRad="41275" dist="20320" dir="1800000" algn="tl" rotWithShape="0">
+                  <a:srgbClr val="000000">
+                    <a:alpha val="40000"/>
+                  </a:srgbClr>
+                </a:outerShdw>
+              </a:effectLst>
+            </a:endParaRPr>
+          </a:p>
+        </p:txBody>
+      </p:sp>
+      <p:sp>
+        <p:nvSpPr>
+          <p:cNvPr id="6" name="Isosceles Triangle 5"/>
+          <p:cNvSpPr/>
+          <p:nvPr/>
+        </p:nvSpPr>
+        <p:spPr>
+          <a:xfrm>
+            <a:off x="3028950" y="0"/>
+            <a:ext cx="800100" cy="190500"/>
+          </a:xfrm>
+          <a:prstGeom prst="triangle">
+            <a:avLst/>
+          </a:prstGeom>
+        </p:spPr>
+        <p:style>
+          <a:lnRef idx="2">
+            <a:schemeClr val="accent1">
+              <a:shade val="50000"/>
+            </a:schemeClr>
+          </a:lnRef>
+          <a:fillRef idx="1">
+            <a:schemeClr val="accent1"/>
+          </a:fillRef>
+          <a:effectRef idx="0">
+            <a:schemeClr val="accent1"/>
+          </a:effectRef>
+          <a:fontRef idx="minor">
+            <a:schemeClr val="lt1"/>
+          </a:fontRef>
+        </p:style>
+        <p:txBody>
+          <a:bodyPr rtlCol="0" anchor="ctr"/>
+          <a:lstStyle/>
+          <a:p>
+            <a:pPr algn="ctr"/>
+            <a:endParaRPr lang="en-US"/>
+          </a:p>
+        </p:txBody>
+      </p:sp>
+    </p:spTree>
+    <p:extLst>
+      <p:ext uri="{BB962C8B-B14F-4D97-AF65-F5344CB8AC3E}">
+        <p14:creationId xmlns:p14="http://schemas.microsoft.com/office/powerpoint/2010/main" val="1139947112"/>
+      </p:ext>
+    </p:extLst>
   </p:cSld>
   <p:clrMapOvr>
     <a:masterClrMapping/>
@@ -3097,14 +4605,20 @@
       </p:grpSpPr>
       <p:pic>
         <p:nvPicPr>
-          <p:cNvPr id="2050" name="Picture 2"/>
+          <p:cNvPr id="2050" name="Picture 2" descr="C:\Users\tom\Documents\frameMarkers\frameMarker_001.png"/>
           <p:cNvPicPr>
             <a:picLocks noChangeAspect="1" noChangeArrowheads="1"/>
           </p:cNvPicPr>
           <p:nvPr/>
         </p:nvPicPr>
         <p:blipFill>
-          <a:blip r:embed="rId2" cstate="print"/>
+          <a:blip r:embed="rId2">
+            <a:extLst>
+              <a:ext uri="{28A0092B-C50C-407E-A947-70E740481C1C}">
+                <a14:useLocalDpi xmlns:a14="http://schemas.microsoft.com/office/drawing/2010/main" val="0"/>
+              </a:ext>
+            </a:extLst>
+          </a:blip>
           <a:srcRect/>
           <a:stretch>
             <a:fillRect/>
@@ -3112,22 +4626,145 @@
         </p:blipFill>
         <p:spPr bwMode="auto">
           <a:xfrm>
-            <a:off x="2509838" y="1366838"/>
-            <a:ext cx="4124325" cy="4124325"/>
+            <a:off x="-14844" y="1135578"/>
+            <a:ext cx="6872844" cy="6872844"/>
           </a:xfrm>
           <a:prstGeom prst="rect">
             <a:avLst/>
           </a:prstGeom>
           <a:noFill/>
-          <a:ln w="9525">
-            <a:noFill/>
-            <a:miter lim="800000"/>
-            <a:headEnd/>
-            <a:tailEnd/>
-          </a:ln>
+          <a:extLst>
+            <a:ext uri="{909E8E84-426E-40DD-AFC4-6F175D3DCCD1}">
+              <a14:hiddenFill xmlns:a14="http://schemas.microsoft.com/office/drawing/2010/main">
+                <a:solidFill>
+                  <a:srgbClr val="FFFFFF"/>
+                </a:solidFill>
+              </a14:hiddenFill>
+            </a:ext>
+          </a:extLst>
         </p:spPr>
       </p:pic>
+      <p:sp>
+        <p:nvSpPr>
+          <p:cNvPr id="4" name="Rectangle 3"/>
+          <p:cNvSpPr/>
+          <p:nvPr/>
+        </p:nvSpPr>
+        <p:spPr>
+          <a:xfrm>
+            <a:off x="2818819" y="3787170"/>
+            <a:ext cx="1220362" cy="1569660"/>
+          </a:xfrm>
+          <a:prstGeom prst="rect">
+            <a:avLst/>
+          </a:prstGeom>
+          <a:noFill/>
+        </p:spPr>
+        <p:txBody>
+          <a:bodyPr wrap="square" lIns="91440" tIns="45720" rIns="91440" bIns="45720">
+            <a:spAutoFit/>
+          </a:bodyPr>
+          <a:lstStyle/>
+          <a:p>
+            <a:pPr algn="ctr"/>
+            <a:r>
+              <a:rPr lang="en-US" sz="9600" b="1" cap="none" spc="0" dirty="0" smtClean="0">
+                <a:ln w="12700">
+                  <a:solidFill>
+                    <a:schemeClr val="tx2">
+                      <a:satMod val="155000"/>
+                    </a:schemeClr>
+                  </a:solidFill>
+                  <a:prstDash val="solid"/>
+                </a:ln>
+                <a:solidFill>
+                  <a:schemeClr val="bg2">
+                    <a:tint val="85000"/>
+                    <a:satMod val="155000"/>
+                  </a:schemeClr>
+                </a:solidFill>
+                <a:effectLst>
+                  <a:outerShdw blurRad="41275" dist="20320" dir="1800000" algn="tl" rotWithShape="0">
+                    <a:srgbClr val="000000">
+                      <a:alpha val="40000"/>
+                    </a:srgbClr>
+                  </a:outerShdw>
+                </a:effectLst>
+              </a:rPr>
+              <a:t>1</a:t>
+            </a:r>
+            <a:endParaRPr lang="en-US" sz="9600" b="1" cap="none" spc="0" dirty="0">
+              <a:ln w="12700">
+                <a:solidFill>
+                  <a:schemeClr val="tx2">
+                    <a:satMod val="155000"/>
+                  </a:schemeClr>
+                </a:solidFill>
+                <a:prstDash val="solid"/>
+              </a:ln>
+              <a:solidFill>
+                <a:schemeClr val="bg2">
+                  <a:tint val="85000"/>
+                  <a:satMod val="155000"/>
+                </a:schemeClr>
+              </a:solidFill>
+              <a:effectLst>
+                <a:outerShdw blurRad="41275" dist="20320" dir="1800000" algn="tl" rotWithShape="0">
+                  <a:srgbClr val="000000">
+                    <a:alpha val="40000"/>
+                  </a:srgbClr>
+                </a:outerShdw>
+              </a:effectLst>
+            </a:endParaRPr>
+          </a:p>
+        </p:txBody>
+      </p:sp>
+      <p:sp>
+        <p:nvSpPr>
+          <p:cNvPr id="5" name="Isosceles Triangle 4"/>
+          <p:cNvSpPr/>
+          <p:nvPr/>
+        </p:nvSpPr>
+        <p:spPr>
+          <a:xfrm>
+            <a:off x="3028950" y="0"/>
+            <a:ext cx="800100" cy="190500"/>
+          </a:xfrm>
+          <a:prstGeom prst="triangle">
+            <a:avLst/>
+          </a:prstGeom>
+        </p:spPr>
+        <p:style>
+          <a:lnRef idx="2">
+            <a:schemeClr val="accent1">
+              <a:shade val="50000"/>
+            </a:schemeClr>
+          </a:lnRef>
+          <a:fillRef idx="1">
+            <a:schemeClr val="accent1"/>
+          </a:fillRef>
+          <a:effectRef idx="0">
+            <a:schemeClr val="accent1"/>
+          </a:effectRef>
+          <a:fontRef idx="minor">
+            <a:schemeClr val="lt1"/>
+          </a:fontRef>
+        </p:style>
+        <p:txBody>
+          <a:bodyPr rtlCol="0" anchor="ctr"/>
+          <a:lstStyle/>
+          <a:p>
+            <a:pPr algn="ctr"/>
+            <a:endParaRPr lang="en-US"/>
+          </a:p>
+        </p:txBody>
+      </p:sp>
     </p:spTree>
+    <p:extLst>
+      <p:ext uri="{BB962C8B-B14F-4D97-AF65-F5344CB8AC3E}">
+        <p14:creationId xmlns:p14="http://schemas.microsoft.com/office/powerpoint/2010/main" val="1139947112"/>
+      </p:ext>
+    </p:extLst>
   </p:cSld>
   <p:clrMapOvr>
     <a:masterClrMapping/>
@@ -3154,14 +4791,20 @@
       </p:grpSpPr>
       <p:pic>
         <p:nvPicPr>
-          <p:cNvPr id="3074" name="Picture 2"/>
+          <p:cNvPr id="3074" name="Picture 2" descr="C:\Users\tom\Documents\frameMarkers\frameMarker_002.png"/>
           <p:cNvPicPr>
             <a:picLocks noChangeAspect="1" noChangeArrowheads="1"/>
           </p:cNvPicPr>
           <p:nvPr/>
         </p:nvPicPr>
         <p:blipFill>
-          <a:blip r:embed="rId2" cstate="print"/>
+          <a:blip r:embed="rId2">
+            <a:extLst>
+              <a:ext uri="{28A0092B-C50C-407E-A947-70E740481C1C}">
+                <a14:useLocalDpi xmlns:a14="http://schemas.microsoft.com/office/drawing/2010/main" val="0"/>
+              </a:ext>
+            </a:extLst>
+          </a:blip>
           <a:srcRect/>
           <a:stretch>
             <a:fillRect/>
@@ -3169,22 +4812,145 @@
         </p:blipFill>
         <p:spPr bwMode="auto">
           <a:xfrm>
-            <a:off x="2509838" y="1366838"/>
-            <a:ext cx="4124325" cy="4124325"/>
+            <a:off x="-1" y="1136568"/>
+            <a:ext cx="6870865" cy="6870865"/>
           </a:xfrm>
           <a:prstGeom prst="rect">
             <a:avLst/>
           </a:prstGeom>
           <a:noFill/>
-          <a:ln w="9525">
-            <a:noFill/>
-            <a:miter lim="800000"/>
-            <a:headEnd/>
-            <a:tailEnd/>
-          </a:ln>
+          <a:extLst>
+            <a:ext uri="{909E8E84-426E-40DD-AFC4-6F175D3DCCD1}">
+              <a14:hiddenFill xmlns:a14="http://schemas.microsoft.com/office/drawing/2010/main">
+                <a:solidFill>
+                  <a:srgbClr val="FFFFFF"/>
+                </a:solidFill>
+              </a14:hiddenFill>
+            </a:ext>
+          </a:extLst>
         </p:spPr>
       </p:pic>
+      <p:sp>
+        <p:nvSpPr>
+          <p:cNvPr id="4" name="Rectangle 3"/>
+          <p:cNvSpPr/>
+          <p:nvPr/>
+        </p:nvSpPr>
+        <p:spPr>
+          <a:xfrm>
+            <a:off x="2818819" y="3787170"/>
+            <a:ext cx="1220362" cy="1569660"/>
+          </a:xfrm>
+          <a:prstGeom prst="rect">
+            <a:avLst/>
+          </a:prstGeom>
+          <a:noFill/>
+        </p:spPr>
+        <p:txBody>
+          <a:bodyPr wrap="square" lIns="91440" tIns="45720" rIns="91440" bIns="45720">
+            <a:spAutoFit/>
+          </a:bodyPr>
+          <a:lstStyle/>
+          <a:p>
+            <a:pPr algn="ctr"/>
+            <a:r>
+              <a:rPr lang="en-US" sz="9600" b="1" cap="none" spc="0" dirty="0" smtClean="0">
+                <a:ln w="12700">
+                  <a:solidFill>
+                    <a:schemeClr val="tx2">
+                      <a:satMod val="155000"/>
+                    </a:schemeClr>
+                  </a:solidFill>
+                  <a:prstDash val="solid"/>
+                </a:ln>
+                <a:solidFill>
+                  <a:schemeClr val="bg2">
+                    <a:tint val="85000"/>
+                    <a:satMod val="155000"/>
+                  </a:schemeClr>
+                </a:solidFill>
+                <a:effectLst>
+                  <a:outerShdw blurRad="41275" dist="20320" dir="1800000" algn="tl" rotWithShape="0">
+                    <a:srgbClr val="000000">
+                      <a:alpha val="40000"/>
+                    </a:srgbClr>
+                  </a:outerShdw>
+                </a:effectLst>
+              </a:rPr>
+              <a:t>2</a:t>
+            </a:r>
+            <a:endParaRPr lang="en-US" sz="9600" b="1" cap="none" spc="0" dirty="0">
+              <a:ln w="12700">
+                <a:solidFill>
+                  <a:schemeClr val="tx2">
+                    <a:satMod val="155000"/>
+                  </a:schemeClr>
+                </a:solidFill>
+                <a:prstDash val="solid"/>
+              </a:ln>
+              <a:solidFill>
+                <a:schemeClr val="bg2">
+                  <a:tint val="85000"/>
+                  <a:satMod val="155000"/>
+                </a:schemeClr>
+              </a:solidFill>
+              <a:effectLst>
+                <a:outerShdw blurRad="41275" dist="20320" dir="1800000" algn="tl" rotWithShape="0">
+                  <a:srgbClr val="000000">
+                    <a:alpha val="40000"/>
+                  </a:srgbClr>
+                </a:outerShdw>
+              </a:effectLst>
+            </a:endParaRPr>
+          </a:p>
+        </p:txBody>
+      </p:sp>
+      <p:sp>
+        <p:nvSpPr>
+          <p:cNvPr id="5" name="Isosceles Triangle 4"/>
+          <p:cNvSpPr/>
+          <p:nvPr/>
+        </p:nvSpPr>
+        <p:spPr>
+          <a:xfrm>
+            <a:off x="3028950" y="0"/>
+            <a:ext cx="800100" cy="190500"/>
+          </a:xfrm>
+          <a:prstGeom prst="triangle">
+            <a:avLst/>
+          </a:prstGeom>
+        </p:spPr>
+        <p:style>
+          <a:lnRef idx="2">
+            <a:schemeClr val="accent1">
+              <a:shade val="50000"/>
+            </a:schemeClr>
+          </a:lnRef>
+          <a:fillRef idx="1">
+            <a:schemeClr val="accent1"/>
+          </a:fillRef>
+          <a:effectRef idx="0">
+            <a:schemeClr val="accent1"/>
+          </a:effectRef>
+          <a:fontRef idx="minor">
+            <a:schemeClr val="lt1"/>
+          </a:fontRef>
+        </p:style>
+        <p:txBody>
+          <a:bodyPr rtlCol="0" anchor="ctr"/>
+          <a:lstStyle/>
+          <a:p>
+            <a:pPr algn="ctr"/>
+            <a:endParaRPr lang="en-US"/>
+          </a:p>
+        </p:txBody>
+      </p:sp>
     </p:spTree>
+    <p:extLst>
+      <p:ext uri="{BB962C8B-B14F-4D97-AF65-F5344CB8AC3E}">
+        <p14:creationId xmlns:p14="http://schemas.microsoft.com/office/powerpoint/2010/main" val="1139947112"/>
+      </p:ext>
+    </p:extLst>
   </p:cSld>
   <p:clrMapOvr>
     <a:masterClrMapping/>
@@ -3211,14 +4977,20 @@
       </p:grpSpPr>
       <p:pic>
         <p:nvPicPr>
-          <p:cNvPr id="4098" name="Picture 2"/>
+          <p:cNvPr id="4098" name="Picture 2" descr="C:\Users\tom\Documents\frameMarkers\frameMarker_003.png"/>
           <p:cNvPicPr>
             <a:picLocks noChangeAspect="1" noChangeArrowheads="1"/>
           </p:cNvPicPr>
           <p:nvPr/>
         </p:nvPicPr>
         <p:blipFill>
-          <a:blip r:embed="rId2" cstate="print"/>
+          <a:blip r:embed="rId2">
+            <a:extLst>
+              <a:ext uri="{28A0092B-C50C-407E-A947-70E740481C1C}">
+                <a14:useLocalDpi xmlns:a14="http://schemas.microsoft.com/office/drawing/2010/main" val="0"/>
+              </a:ext>
+            </a:extLst>
+          </a:blip>
           <a:srcRect/>
           <a:stretch>
             <a:fillRect/>
@@ -3226,22 +4998,1075 @@
         </p:blipFill>
         <p:spPr bwMode="auto">
           <a:xfrm>
-            <a:off x="2509838" y="1366838"/>
-            <a:ext cx="4124325" cy="4124325"/>
+            <a:off x="-8906" y="1138547"/>
+            <a:ext cx="6866906" cy="6866906"/>
           </a:xfrm>
           <a:prstGeom prst="rect">
             <a:avLst/>
           </a:prstGeom>
           <a:noFill/>
-          <a:ln w="9525">
-            <a:noFill/>
-            <a:miter lim="800000"/>
-            <a:headEnd/>
-            <a:tailEnd/>
-          </a:ln>
+          <a:extLst>
+            <a:ext uri="{909E8E84-426E-40DD-AFC4-6F175D3DCCD1}">
+              <a14:hiddenFill xmlns:a14="http://schemas.microsoft.com/office/drawing/2010/main">
+                <a:solidFill>
+                  <a:srgbClr val="FFFFFF"/>
+                </a:solidFill>
+              </a14:hiddenFill>
+            </a:ext>
+          </a:extLst>
         </p:spPr>
       </p:pic>
+      <p:sp>
+        <p:nvSpPr>
+          <p:cNvPr id="4" name="Rectangle 3"/>
+          <p:cNvSpPr/>
+          <p:nvPr/>
+        </p:nvSpPr>
+        <p:spPr>
+          <a:xfrm>
+            <a:off x="2818819" y="3787170"/>
+            <a:ext cx="1220362" cy="1569660"/>
+          </a:xfrm>
+          <a:prstGeom prst="rect">
+            <a:avLst/>
+          </a:prstGeom>
+          <a:noFill/>
+        </p:spPr>
+        <p:txBody>
+          <a:bodyPr wrap="square" lIns="91440" tIns="45720" rIns="91440" bIns="45720">
+            <a:spAutoFit/>
+          </a:bodyPr>
+          <a:lstStyle/>
+          <a:p>
+            <a:pPr algn="ctr"/>
+            <a:r>
+              <a:rPr lang="en-US" sz="9600" b="1" cap="none" spc="0" dirty="0" smtClean="0">
+                <a:ln w="12700">
+                  <a:solidFill>
+                    <a:schemeClr val="tx2">
+                      <a:satMod val="155000"/>
+                    </a:schemeClr>
+                  </a:solidFill>
+                  <a:prstDash val="solid"/>
+                </a:ln>
+                <a:solidFill>
+                  <a:schemeClr val="bg2">
+                    <a:tint val="85000"/>
+                    <a:satMod val="155000"/>
+                  </a:schemeClr>
+                </a:solidFill>
+                <a:effectLst>
+                  <a:outerShdw blurRad="41275" dist="20320" dir="1800000" algn="tl" rotWithShape="0">
+                    <a:srgbClr val="000000">
+                      <a:alpha val="40000"/>
+                    </a:srgbClr>
+                  </a:outerShdw>
+                </a:effectLst>
+              </a:rPr>
+              <a:t>3</a:t>
+            </a:r>
+            <a:endParaRPr lang="en-US" sz="9600" b="1" cap="none" spc="0" dirty="0">
+              <a:ln w="12700">
+                <a:solidFill>
+                  <a:schemeClr val="tx2">
+                    <a:satMod val="155000"/>
+                  </a:schemeClr>
+                </a:solidFill>
+                <a:prstDash val="solid"/>
+              </a:ln>
+              <a:solidFill>
+                <a:schemeClr val="bg2">
+                  <a:tint val="85000"/>
+                  <a:satMod val="155000"/>
+                </a:schemeClr>
+              </a:solidFill>
+              <a:effectLst>
+                <a:outerShdw blurRad="41275" dist="20320" dir="1800000" algn="tl" rotWithShape="0">
+                  <a:srgbClr val="000000">
+                    <a:alpha val="40000"/>
+                  </a:srgbClr>
+                </a:outerShdw>
+              </a:effectLst>
+            </a:endParaRPr>
+          </a:p>
+        </p:txBody>
+      </p:sp>
+      <p:sp>
+        <p:nvSpPr>
+          <p:cNvPr id="5" name="Isosceles Triangle 4"/>
+          <p:cNvSpPr/>
+          <p:nvPr/>
+        </p:nvSpPr>
+        <p:spPr>
+          <a:xfrm>
+            <a:off x="3028950" y="0"/>
+            <a:ext cx="800100" cy="190500"/>
+          </a:xfrm>
+          <a:prstGeom prst="triangle">
+            <a:avLst/>
+          </a:prstGeom>
+        </p:spPr>
+        <p:style>
+          <a:lnRef idx="2">
+            <a:schemeClr val="accent1">
+              <a:shade val="50000"/>
+            </a:schemeClr>
+          </a:lnRef>
+          <a:fillRef idx="1">
+            <a:schemeClr val="accent1"/>
+          </a:fillRef>
+          <a:effectRef idx="0">
+            <a:schemeClr val="accent1"/>
+          </a:effectRef>
+          <a:fontRef idx="minor">
+            <a:schemeClr val="lt1"/>
+          </a:fontRef>
+        </p:style>
+        <p:txBody>
+          <a:bodyPr rtlCol="0" anchor="ctr"/>
+          <a:lstStyle/>
+          <a:p>
+            <a:pPr algn="ctr"/>
+            <a:endParaRPr lang="en-US"/>
+          </a:p>
+        </p:txBody>
+      </p:sp>
     </p:spTree>
+    <p:extLst>
+      <p:ext uri="{BB962C8B-B14F-4D97-AF65-F5344CB8AC3E}">
+        <p14:creationId xmlns:p14="http://schemas.microsoft.com/office/powerpoint/2010/main" val="1139947112"/>
+      </p:ext>
+    </p:extLst>
+  </p:cSld>
+  <p:clrMapOvr>
+    <a:masterClrMapping/>
+  </p:clrMapOvr>
+</p:sld>
+</file>
+
+<file path=ppt/slides/slide5.xml><?xml version="1.0" encoding="utf-8"?>
+<p:sld xmlns:a="http://schemas.openxmlformats.org/drawingml/2006/main" xmlns:r="http://schemas.openxmlformats.org/officeDocument/2006/relationships" xmlns:p="http://schemas.openxmlformats.org/presentationml/2006/main">
+  <p:cSld>
+    <p:spTree>
+      <p:nvGrpSpPr>
+        <p:cNvPr id="1" name=""/>
+        <p:cNvGrpSpPr/>
+        <p:nvPr/>
+      </p:nvGrpSpPr>
+      <p:grpSpPr>
+        <a:xfrm>
+          <a:off x="0" y="0"/>
+          <a:ext cx="0" cy="0"/>
+          <a:chOff x="0" y="0"/>
+          <a:chExt cx="0" cy="0"/>
+        </a:xfrm>
+      </p:grpSpPr>
+      <p:pic>
+        <p:nvPicPr>
+          <p:cNvPr id="5122" name="Picture 2" descr="C:\Users\tom\Documents\frameMarkers\frameMarker_004.png"/>
+          <p:cNvPicPr>
+            <a:picLocks noChangeAspect="1" noChangeArrowheads="1"/>
+          </p:cNvPicPr>
+          <p:nvPr/>
+        </p:nvPicPr>
+        <p:blipFill>
+          <a:blip r:embed="rId2">
+            <a:extLst>
+              <a:ext uri="{28A0092B-C50C-407E-A947-70E740481C1C}">
+                <a14:useLocalDpi xmlns:a14="http://schemas.microsoft.com/office/drawing/2010/main" val="0"/>
+              </a:ext>
+            </a:extLst>
+          </a:blip>
+          <a:srcRect/>
+          <a:stretch>
+            <a:fillRect/>
+          </a:stretch>
+        </p:blipFill>
+        <p:spPr bwMode="auto">
+          <a:xfrm>
+            <a:off x="13854" y="1149928"/>
+            <a:ext cx="6844145" cy="6844145"/>
+          </a:xfrm>
+          <a:prstGeom prst="rect">
+            <a:avLst/>
+          </a:prstGeom>
+          <a:noFill/>
+          <a:extLst>
+            <a:ext uri="{909E8E84-426E-40DD-AFC4-6F175D3DCCD1}">
+              <a14:hiddenFill xmlns:a14="http://schemas.microsoft.com/office/drawing/2010/main">
+                <a:solidFill>
+                  <a:srgbClr val="FFFFFF"/>
+                </a:solidFill>
+              </a14:hiddenFill>
+            </a:ext>
+          </a:extLst>
+        </p:spPr>
+      </p:pic>
+      <p:sp>
+        <p:nvSpPr>
+          <p:cNvPr id="4" name="Rectangle 3"/>
+          <p:cNvSpPr/>
+          <p:nvPr/>
+        </p:nvSpPr>
+        <p:spPr>
+          <a:xfrm>
+            <a:off x="2818819" y="3787170"/>
+            <a:ext cx="1220362" cy="1569660"/>
+          </a:xfrm>
+          <a:prstGeom prst="rect">
+            <a:avLst/>
+          </a:prstGeom>
+          <a:noFill/>
+        </p:spPr>
+        <p:txBody>
+          <a:bodyPr wrap="square" lIns="91440" tIns="45720" rIns="91440" bIns="45720">
+            <a:spAutoFit/>
+          </a:bodyPr>
+          <a:lstStyle/>
+          <a:p>
+            <a:pPr algn="ctr"/>
+            <a:r>
+              <a:rPr lang="en-US" sz="9600" b="1" cap="none" spc="0" dirty="0" smtClean="0">
+                <a:ln w="12700">
+                  <a:solidFill>
+                    <a:schemeClr val="tx2">
+                      <a:satMod val="155000"/>
+                    </a:schemeClr>
+                  </a:solidFill>
+                  <a:prstDash val="solid"/>
+                </a:ln>
+                <a:solidFill>
+                  <a:schemeClr val="bg2">
+                    <a:tint val="85000"/>
+                    <a:satMod val="155000"/>
+                  </a:schemeClr>
+                </a:solidFill>
+                <a:effectLst>
+                  <a:outerShdw blurRad="41275" dist="20320" dir="1800000" algn="tl" rotWithShape="0">
+                    <a:srgbClr val="000000">
+                      <a:alpha val="40000"/>
+                    </a:srgbClr>
+                  </a:outerShdw>
+                </a:effectLst>
+              </a:rPr>
+              <a:t>4</a:t>
+            </a:r>
+            <a:endParaRPr lang="en-US" sz="9600" b="1" cap="none" spc="0" dirty="0">
+              <a:ln w="12700">
+                <a:solidFill>
+                  <a:schemeClr val="tx2">
+                    <a:satMod val="155000"/>
+                  </a:schemeClr>
+                </a:solidFill>
+                <a:prstDash val="solid"/>
+              </a:ln>
+              <a:solidFill>
+                <a:schemeClr val="bg2">
+                  <a:tint val="85000"/>
+                  <a:satMod val="155000"/>
+                </a:schemeClr>
+              </a:solidFill>
+              <a:effectLst>
+                <a:outerShdw blurRad="41275" dist="20320" dir="1800000" algn="tl" rotWithShape="0">
+                  <a:srgbClr val="000000">
+                    <a:alpha val="40000"/>
+                  </a:srgbClr>
+                </a:outerShdw>
+              </a:effectLst>
+            </a:endParaRPr>
+          </a:p>
+        </p:txBody>
+      </p:sp>
+      <p:sp>
+        <p:nvSpPr>
+          <p:cNvPr id="5" name="Isosceles Triangle 4"/>
+          <p:cNvSpPr/>
+          <p:nvPr/>
+        </p:nvSpPr>
+        <p:spPr>
+          <a:xfrm>
+            <a:off x="3028950" y="0"/>
+            <a:ext cx="800100" cy="190500"/>
+          </a:xfrm>
+          <a:prstGeom prst="triangle">
+            <a:avLst/>
+          </a:prstGeom>
+        </p:spPr>
+        <p:style>
+          <a:lnRef idx="2">
+            <a:schemeClr val="accent1">
+              <a:shade val="50000"/>
+            </a:schemeClr>
+          </a:lnRef>
+          <a:fillRef idx="1">
+            <a:schemeClr val="accent1"/>
+          </a:fillRef>
+          <a:effectRef idx="0">
+            <a:schemeClr val="accent1"/>
+          </a:effectRef>
+          <a:fontRef idx="minor">
+            <a:schemeClr val="lt1"/>
+          </a:fontRef>
+        </p:style>
+        <p:txBody>
+          <a:bodyPr rtlCol="0" anchor="ctr"/>
+          <a:lstStyle/>
+          <a:p>
+            <a:pPr algn="ctr"/>
+            <a:endParaRPr lang="en-US"/>
+          </a:p>
+        </p:txBody>
+      </p:sp>
+    </p:spTree>
+    <p:extLst>
+      <p:ext uri="{BB962C8B-B14F-4D97-AF65-F5344CB8AC3E}">
+        <p14:creationId xmlns:p14="http://schemas.microsoft.com/office/powerpoint/2010/main" val="1139947112"/>
+      </p:ext>
+    </p:extLst>
+  </p:cSld>
+  <p:clrMapOvr>
+    <a:masterClrMapping/>
+  </p:clrMapOvr>
+</p:sld>
+</file>
+
+<file path=ppt/slides/slide6.xml><?xml version="1.0" encoding="utf-8"?>
+<p:sld xmlns:a="http://schemas.openxmlformats.org/drawingml/2006/main" xmlns:r="http://schemas.openxmlformats.org/officeDocument/2006/relationships" xmlns:p="http://schemas.openxmlformats.org/presentationml/2006/main">
+  <p:cSld>
+    <p:spTree>
+      <p:nvGrpSpPr>
+        <p:cNvPr id="1" name=""/>
+        <p:cNvGrpSpPr/>
+        <p:nvPr/>
+      </p:nvGrpSpPr>
+      <p:grpSpPr>
+        <a:xfrm>
+          <a:off x="0" y="0"/>
+          <a:ext cx="0" cy="0"/>
+          <a:chOff x="0" y="0"/>
+          <a:chExt cx="0" cy="0"/>
+        </a:xfrm>
+      </p:grpSpPr>
+      <p:pic>
+        <p:nvPicPr>
+          <p:cNvPr id="6146" name="Picture 2" descr="C:\Users\tom\Documents\frameMarkers\frameMarker_005.png"/>
+          <p:cNvPicPr>
+            <a:picLocks noChangeAspect="1" noChangeArrowheads="1"/>
+          </p:cNvPicPr>
+          <p:nvPr/>
+        </p:nvPicPr>
+        <p:blipFill>
+          <a:blip r:embed="rId2">
+            <a:extLst>
+              <a:ext uri="{28A0092B-C50C-407E-A947-70E740481C1C}">
+                <a14:useLocalDpi xmlns:a14="http://schemas.microsoft.com/office/drawing/2010/main" val="0"/>
+              </a:ext>
+            </a:extLst>
+          </a:blip>
+          <a:srcRect/>
+          <a:stretch>
+            <a:fillRect/>
+          </a:stretch>
+        </p:blipFill>
+        <p:spPr bwMode="auto">
+          <a:xfrm>
+            <a:off x="0" y="1143000"/>
+            <a:ext cx="6858000" cy="6858000"/>
+          </a:xfrm>
+          <a:prstGeom prst="rect">
+            <a:avLst/>
+          </a:prstGeom>
+          <a:noFill/>
+          <a:extLst>
+            <a:ext uri="{909E8E84-426E-40DD-AFC4-6F175D3DCCD1}">
+              <a14:hiddenFill xmlns:a14="http://schemas.microsoft.com/office/drawing/2010/main">
+                <a:solidFill>
+                  <a:srgbClr val="FFFFFF"/>
+                </a:solidFill>
+              </a14:hiddenFill>
+            </a:ext>
+          </a:extLst>
+        </p:spPr>
+      </p:pic>
+      <p:sp>
+        <p:nvSpPr>
+          <p:cNvPr id="4" name="Rectangle 3"/>
+          <p:cNvSpPr/>
+          <p:nvPr/>
+        </p:nvSpPr>
+        <p:spPr>
+          <a:xfrm>
+            <a:off x="2818819" y="3787170"/>
+            <a:ext cx="1220362" cy="1569660"/>
+          </a:xfrm>
+          <a:prstGeom prst="rect">
+            <a:avLst/>
+          </a:prstGeom>
+          <a:noFill/>
+        </p:spPr>
+        <p:txBody>
+          <a:bodyPr wrap="square" lIns="91440" tIns="45720" rIns="91440" bIns="45720">
+            <a:spAutoFit/>
+          </a:bodyPr>
+          <a:lstStyle/>
+          <a:p>
+            <a:pPr algn="ctr"/>
+            <a:r>
+              <a:rPr lang="en-US" sz="9600" b="1" cap="none" spc="0" dirty="0" smtClean="0">
+                <a:ln w="12700">
+                  <a:solidFill>
+                    <a:schemeClr val="tx2">
+                      <a:satMod val="155000"/>
+                    </a:schemeClr>
+                  </a:solidFill>
+                  <a:prstDash val="solid"/>
+                </a:ln>
+                <a:solidFill>
+                  <a:schemeClr val="bg2">
+                    <a:tint val="85000"/>
+                    <a:satMod val="155000"/>
+                  </a:schemeClr>
+                </a:solidFill>
+                <a:effectLst>
+                  <a:outerShdw blurRad="41275" dist="20320" dir="1800000" algn="tl" rotWithShape="0">
+                    <a:srgbClr val="000000">
+                      <a:alpha val="40000"/>
+                    </a:srgbClr>
+                  </a:outerShdw>
+                </a:effectLst>
+              </a:rPr>
+              <a:t>5</a:t>
+            </a:r>
+            <a:endParaRPr lang="en-US" sz="9600" b="1" cap="none" spc="0" dirty="0">
+              <a:ln w="12700">
+                <a:solidFill>
+                  <a:schemeClr val="tx2">
+                    <a:satMod val="155000"/>
+                  </a:schemeClr>
+                </a:solidFill>
+                <a:prstDash val="solid"/>
+              </a:ln>
+              <a:solidFill>
+                <a:schemeClr val="bg2">
+                  <a:tint val="85000"/>
+                  <a:satMod val="155000"/>
+                </a:schemeClr>
+              </a:solidFill>
+              <a:effectLst>
+                <a:outerShdw blurRad="41275" dist="20320" dir="1800000" algn="tl" rotWithShape="0">
+                  <a:srgbClr val="000000">
+                    <a:alpha val="40000"/>
+                  </a:srgbClr>
+                </a:outerShdw>
+              </a:effectLst>
+            </a:endParaRPr>
+          </a:p>
+        </p:txBody>
+      </p:sp>
+      <p:sp>
+        <p:nvSpPr>
+          <p:cNvPr id="5" name="Isosceles Triangle 4"/>
+          <p:cNvSpPr/>
+          <p:nvPr/>
+        </p:nvSpPr>
+        <p:spPr>
+          <a:xfrm>
+            <a:off x="3028950" y="0"/>
+            <a:ext cx="800100" cy="190500"/>
+          </a:xfrm>
+          <a:prstGeom prst="triangle">
+            <a:avLst/>
+          </a:prstGeom>
+        </p:spPr>
+        <p:style>
+          <a:lnRef idx="2">
+            <a:schemeClr val="accent1">
+              <a:shade val="50000"/>
+            </a:schemeClr>
+          </a:lnRef>
+          <a:fillRef idx="1">
+            <a:schemeClr val="accent1"/>
+          </a:fillRef>
+          <a:effectRef idx="0">
+            <a:schemeClr val="accent1"/>
+          </a:effectRef>
+          <a:fontRef idx="minor">
+            <a:schemeClr val="lt1"/>
+          </a:fontRef>
+        </p:style>
+        <p:txBody>
+          <a:bodyPr rtlCol="0" anchor="ctr"/>
+          <a:lstStyle/>
+          <a:p>
+            <a:pPr algn="ctr"/>
+            <a:endParaRPr lang="en-US"/>
+          </a:p>
+        </p:txBody>
+      </p:sp>
+    </p:spTree>
+    <p:extLst>
+      <p:ext uri="{BB962C8B-B14F-4D97-AF65-F5344CB8AC3E}">
+        <p14:creationId xmlns:p14="http://schemas.microsoft.com/office/powerpoint/2010/main" val="1139947112"/>
+      </p:ext>
+    </p:extLst>
+  </p:cSld>
+  <p:clrMapOvr>
+    <a:masterClrMapping/>
+  </p:clrMapOvr>
+</p:sld>
+</file>
+
+<file path=ppt/slides/slide7.xml><?xml version="1.0" encoding="utf-8"?>
+<p:sld xmlns:a="http://schemas.openxmlformats.org/drawingml/2006/main" xmlns:r="http://schemas.openxmlformats.org/officeDocument/2006/relationships" xmlns:p="http://schemas.openxmlformats.org/presentationml/2006/main">
+  <p:cSld>
+    <p:spTree>
+      <p:nvGrpSpPr>
+        <p:cNvPr id="1" name=""/>
+        <p:cNvGrpSpPr/>
+        <p:nvPr/>
+      </p:nvGrpSpPr>
+      <p:grpSpPr>
+        <a:xfrm>
+          <a:off x="0" y="0"/>
+          <a:ext cx="0" cy="0"/>
+          <a:chOff x="0" y="0"/>
+          <a:chExt cx="0" cy="0"/>
+        </a:xfrm>
+      </p:grpSpPr>
+      <p:pic>
+        <p:nvPicPr>
+          <p:cNvPr id="7170" name="Picture 2" descr="C:\Users\tom\Documents\frameMarkers\frameMarker_006.png"/>
+          <p:cNvPicPr>
+            <a:picLocks noChangeAspect="1" noChangeArrowheads="1"/>
+          </p:cNvPicPr>
+          <p:nvPr/>
+        </p:nvPicPr>
+        <p:blipFill>
+          <a:blip r:embed="rId2">
+            <a:extLst>
+              <a:ext uri="{28A0092B-C50C-407E-A947-70E740481C1C}">
+                <a14:useLocalDpi xmlns:a14="http://schemas.microsoft.com/office/drawing/2010/main" val="0"/>
+              </a:ext>
+            </a:extLst>
+          </a:blip>
+          <a:srcRect/>
+          <a:stretch>
+            <a:fillRect/>
+          </a:stretch>
+        </p:blipFill>
+        <p:spPr bwMode="auto">
+          <a:xfrm>
+            <a:off x="0" y="1143000"/>
+            <a:ext cx="6858000" cy="6858000"/>
+          </a:xfrm>
+          <a:prstGeom prst="rect">
+            <a:avLst/>
+          </a:prstGeom>
+          <a:noFill/>
+          <a:extLst>
+            <a:ext uri="{909E8E84-426E-40DD-AFC4-6F175D3DCCD1}">
+              <a14:hiddenFill xmlns:a14="http://schemas.microsoft.com/office/drawing/2010/main">
+                <a:solidFill>
+                  <a:srgbClr val="FFFFFF"/>
+                </a:solidFill>
+              </a14:hiddenFill>
+            </a:ext>
+          </a:extLst>
+        </p:spPr>
+      </p:pic>
+      <p:sp>
+        <p:nvSpPr>
+          <p:cNvPr id="4" name="Rectangle 3"/>
+          <p:cNvSpPr/>
+          <p:nvPr/>
+        </p:nvSpPr>
+        <p:spPr>
+          <a:xfrm>
+            <a:off x="2818819" y="3787170"/>
+            <a:ext cx="1220362" cy="1569660"/>
+          </a:xfrm>
+          <a:prstGeom prst="rect">
+            <a:avLst/>
+          </a:prstGeom>
+          <a:noFill/>
+        </p:spPr>
+        <p:txBody>
+          <a:bodyPr wrap="square" lIns="91440" tIns="45720" rIns="91440" bIns="45720">
+            <a:spAutoFit/>
+          </a:bodyPr>
+          <a:lstStyle/>
+          <a:p>
+            <a:pPr algn="ctr"/>
+            <a:r>
+              <a:rPr lang="en-US" sz="9600" b="1" cap="none" spc="0" dirty="0" smtClean="0">
+                <a:ln w="12700">
+                  <a:solidFill>
+                    <a:schemeClr val="tx2">
+                      <a:satMod val="155000"/>
+                    </a:schemeClr>
+                  </a:solidFill>
+                  <a:prstDash val="solid"/>
+                </a:ln>
+                <a:solidFill>
+                  <a:schemeClr val="bg2">
+                    <a:tint val="85000"/>
+                    <a:satMod val="155000"/>
+                  </a:schemeClr>
+                </a:solidFill>
+                <a:effectLst>
+                  <a:outerShdw blurRad="41275" dist="20320" dir="1800000" algn="tl" rotWithShape="0">
+                    <a:srgbClr val="000000">
+                      <a:alpha val="40000"/>
+                    </a:srgbClr>
+                  </a:outerShdw>
+                </a:effectLst>
+              </a:rPr>
+              <a:t>6</a:t>
+            </a:r>
+            <a:endParaRPr lang="en-US" sz="9600" b="1" cap="none" spc="0" dirty="0">
+              <a:ln w="12700">
+                <a:solidFill>
+                  <a:schemeClr val="tx2">
+                    <a:satMod val="155000"/>
+                  </a:schemeClr>
+                </a:solidFill>
+                <a:prstDash val="solid"/>
+              </a:ln>
+              <a:solidFill>
+                <a:schemeClr val="bg2">
+                  <a:tint val="85000"/>
+                  <a:satMod val="155000"/>
+                </a:schemeClr>
+              </a:solidFill>
+              <a:effectLst>
+                <a:outerShdw blurRad="41275" dist="20320" dir="1800000" algn="tl" rotWithShape="0">
+                  <a:srgbClr val="000000">
+                    <a:alpha val="40000"/>
+                  </a:srgbClr>
+                </a:outerShdw>
+              </a:effectLst>
+            </a:endParaRPr>
+          </a:p>
+        </p:txBody>
+      </p:sp>
+      <p:sp>
+        <p:nvSpPr>
+          <p:cNvPr id="5" name="Isosceles Triangle 4"/>
+          <p:cNvSpPr/>
+          <p:nvPr/>
+        </p:nvSpPr>
+        <p:spPr>
+          <a:xfrm>
+            <a:off x="3028950" y="0"/>
+            <a:ext cx="800100" cy="190500"/>
+          </a:xfrm>
+          <a:prstGeom prst="triangle">
+            <a:avLst/>
+          </a:prstGeom>
+        </p:spPr>
+        <p:style>
+          <a:lnRef idx="2">
+            <a:schemeClr val="accent1">
+              <a:shade val="50000"/>
+            </a:schemeClr>
+          </a:lnRef>
+          <a:fillRef idx="1">
+            <a:schemeClr val="accent1"/>
+          </a:fillRef>
+          <a:effectRef idx="0">
+            <a:schemeClr val="accent1"/>
+          </a:effectRef>
+          <a:fontRef idx="minor">
+            <a:schemeClr val="lt1"/>
+          </a:fontRef>
+        </p:style>
+        <p:txBody>
+          <a:bodyPr rtlCol="0" anchor="ctr"/>
+          <a:lstStyle/>
+          <a:p>
+            <a:pPr algn="ctr"/>
+            <a:endParaRPr lang="en-US"/>
+          </a:p>
+        </p:txBody>
+      </p:sp>
+    </p:spTree>
+    <p:extLst>
+      <p:ext uri="{BB962C8B-B14F-4D97-AF65-F5344CB8AC3E}">
+        <p14:creationId xmlns:p14="http://schemas.microsoft.com/office/powerpoint/2010/main" val="1139947112"/>
+      </p:ext>
+    </p:extLst>
+  </p:cSld>
+  <p:clrMapOvr>
+    <a:masterClrMapping/>
+  </p:clrMapOvr>
+</p:sld>
+</file>
+
+<file path=ppt/slides/slide8.xml><?xml version="1.0" encoding="utf-8"?>
+<p:sld xmlns:a="http://schemas.openxmlformats.org/drawingml/2006/main" xmlns:r="http://schemas.openxmlformats.org/officeDocument/2006/relationships" xmlns:p="http://schemas.openxmlformats.org/presentationml/2006/main">
+  <p:cSld>
+    <p:spTree>
+      <p:nvGrpSpPr>
+        <p:cNvPr id="1" name=""/>
+        <p:cNvGrpSpPr/>
+        <p:nvPr/>
+      </p:nvGrpSpPr>
+      <p:grpSpPr>
+        <a:xfrm>
+          <a:off x="0" y="0"/>
+          <a:ext cx="0" cy="0"/>
+          <a:chOff x="0" y="0"/>
+          <a:chExt cx="0" cy="0"/>
+        </a:xfrm>
+      </p:grpSpPr>
+      <p:pic>
+        <p:nvPicPr>
+          <p:cNvPr id="8194" name="Picture 2" descr="C:\Users\tom\Documents\frameMarkers\frameMarker_007.png"/>
+          <p:cNvPicPr>
+            <a:picLocks noChangeAspect="1" noChangeArrowheads="1"/>
+          </p:cNvPicPr>
+          <p:nvPr/>
+        </p:nvPicPr>
+        <p:blipFill>
+          <a:blip r:embed="rId2">
+            <a:extLst>
+              <a:ext uri="{28A0092B-C50C-407E-A947-70E740481C1C}">
+                <a14:useLocalDpi xmlns:a14="http://schemas.microsoft.com/office/drawing/2010/main" val="0"/>
+              </a:ext>
+            </a:extLst>
+          </a:blip>
+          <a:srcRect/>
+          <a:stretch>
+            <a:fillRect/>
+          </a:stretch>
+        </p:blipFill>
+        <p:spPr bwMode="auto">
+          <a:xfrm>
+            <a:off x="0" y="1143000"/>
+            <a:ext cx="6858000" cy="6858000"/>
+          </a:xfrm>
+          <a:prstGeom prst="rect">
+            <a:avLst/>
+          </a:prstGeom>
+          <a:noFill/>
+          <a:extLst>
+            <a:ext uri="{909E8E84-426E-40DD-AFC4-6F175D3DCCD1}">
+              <a14:hiddenFill xmlns:a14="http://schemas.microsoft.com/office/drawing/2010/main">
+                <a:solidFill>
+                  <a:srgbClr val="FFFFFF"/>
+                </a:solidFill>
+              </a14:hiddenFill>
+            </a:ext>
+          </a:extLst>
+        </p:spPr>
+      </p:pic>
+      <p:sp>
+        <p:nvSpPr>
+          <p:cNvPr id="4" name="Rectangle 3"/>
+          <p:cNvSpPr/>
+          <p:nvPr/>
+        </p:nvSpPr>
+        <p:spPr>
+          <a:xfrm>
+            <a:off x="2818819" y="3787170"/>
+            <a:ext cx="1220362" cy="1569660"/>
+          </a:xfrm>
+          <a:prstGeom prst="rect">
+            <a:avLst/>
+          </a:prstGeom>
+          <a:noFill/>
+        </p:spPr>
+        <p:txBody>
+          <a:bodyPr wrap="square" lIns="91440" tIns="45720" rIns="91440" bIns="45720">
+            <a:spAutoFit/>
+          </a:bodyPr>
+          <a:lstStyle/>
+          <a:p>
+            <a:pPr algn="ctr"/>
+            <a:r>
+              <a:rPr lang="en-US" sz="9600" b="1" cap="none" spc="0" dirty="0" smtClean="0">
+                <a:ln w="12700">
+                  <a:solidFill>
+                    <a:schemeClr val="tx2">
+                      <a:satMod val="155000"/>
+                    </a:schemeClr>
+                  </a:solidFill>
+                  <a:prstDash val="solid"/>
+                </a:ln>
+                <a:solidFill>
+                  <a:schemeClr val="bg2">
+                    <a:tint val="85000"/>
+                    <a:satMod val="155000"/>
+                  </a:schemeClr>
+                </a:solidFill>
+                <a:effectLst>
+                  <a:outerShdw blurRad="41275" dist="20320" dir="1800000" algn="tl" rotWithShape="0">
+                    <a:srgbClr val="000000">
+                      <a:alpha val="40000"/>
+                    </a:srgbClr>
+                  </a:outerShdw>
+                </a:effectLst>
+              </a:rPr>
+              <a:t>7</a:t>
+            </a:r>
+            <a:endParaRPr lang="en-US" sz="9600" b="1" cap="none" spc="0" dirty="0">
+              <a:ln w="12700">
+                <a:solidFill>
+                  <a:schemeClr val="tx2">
+                    <a:satMod val="155000"/>
+                  </a:schemeClr>
+                </a:solidFill>
+                <a:prstDash val="solid"/>
+              </a:ln>
+              <a:solidFill>
+                <a:schemeClr val="bg2">
+                  <a:tint val="85000"/>
+                  <a:satMod val="155000"/>
+                </a:schemeClr>
+              </a:solidFill>
+              <a:effectLst>
+                <a:outerShdw blurRad="41275" dist="20320" dir="1800000" algn="tl" rotWithShape="0">
+                  <a:srgbClr val="000000">
+                    <a:alpha val="40000"/>
+                  </a:srgbClr>
+                </a:outerShdw>
+              </a:effectLst>
+            </a:endParaRPr>
+          </a:p>
+        </p:txBody>
+      </p:sp>
+      <p:sp>
+        <p:nvSpPr>
+          <p:cNvPr id="5" name="Isosceles Triangle 4"/>
+          <p:cNvSpPr/>
+          <p:nvPr/>
+        </p:nvSpPr>
+        <p:spPr>
+          <a:xfrm>
+            <a:off x="3028950" y="0"/>
+            <a:ext cx="800100" cy="190500"/>
+          </a:xfrm>
+          <a:prstGeom prst="triangle">
+            <a:avLst/>
+          </a:prstGeom>
+        </p:spPr>
+        <p:style>
+          <a:lnRef idx="2">
+            <a:schemeClr val="accent1">
+              <a:shade val="50000"/>
+            </a:schemeClr>
+          </a:lnRef>
+          <a:fillRef idx="1">
+            <a:schemeClr val="accent1"/>
+          </a:fillRef>
+          <a:effectRef idx="0">
+            <a:schemeClr val="accent1"/>
+          </a:effectRef>
+          <a:fontRef idx="minor">
+            <a:schemeClr val="lt1"/>
+          </a:fontRef>
+        </p:style>
+        <p:txBody>
+          <a:bodyPr rtlCol="0" anchor="ctr"/>
+          <a:lstStyle/>
+          <a:p>
+            <a:pPr algn="ctr"/>
+            <a:endParaRPr lang="en-US"/>
+          </a:p>
+        </p:txBody>
+      </p:sp>
+    </p:spTree>
+    <p:extLst>
+      <p:ext uri="{BB962C8B-B14F-4D97-AF65-F5344CB8AC3E}">
+        <p14:creationId xmlns:p14="http://schemas.microsoft.com/office/powerpoint/2010/main" val="1139947112"/>
+      </p:ext>
+    </p:extLst>
+  </p:cSld>
+  <p:clrMapOvr>
+    <a:masterClrMapping/>
+  </p:clrMapOvr>
+</p:sld>
+</file>
+
+<file path=ppt/slides/slide9.xml><?xml version="1.0" encoding="utf-8"?>
+<p:sld xmlns:a="http://schemas.openxmlformats.org/drawingml/2006/main" xmlns:r="http://schemas.openxmlformats.org/officeDocument/2006/relationships" xmlns:p="http://schemas.openxmlformats.org/presentationml/2006/main">
+  <p:cSld>
+    <p:spTree>
+      <p:nvGrpSpPr>
+        <p:cNvPr id="1" name=""/>
+        <p:cNvGrpSpPr/>
+        <p:nvPr/>
+      </p:nvGrpSpPr>
+      <p:grpSpPr>
+        <a:xfrm>
+          <a:off x="0" y="0"/>
+          <a:ext cx="0" cy="0"/>
+          <a:chOff x="0" y="0"/>
+          <a:chExt cx="0" cy="0"/>
+        </a:xfrm>
+      </p:grpSpPr>
+      <p:pic>
+        <p:nvPicPr>
+          <p:cNvPr id="10242" name="Picture 2" descr="C:\Users\tom\Documents\frameMarkers\frameMarker_009.png"/>
+          <p:cNvPicPr>
+            <a:picLocks noChangeAspect="1" noChangeArrowheads="1"/>
+          </p:cNvPicPr>
+          <p:nvPr/>
+        </p:nvPicPr>
+        <p:blipFill>
+          <a:blip r:embed="rId2">
+            <a:extLst>
+              <a:ext uri="{28A0092B-C50C-407E-A947-70E740481C1C}">
+                <a14:useLocalDpi xmlns:a14="http://schemas.microsoft.com/office/drawing/2010/main" val="0"/>
+              </a:ext>
+            </a:extLst>
+          </a:blip>
+          <a:srcRect/>
+          <a:stretch>
+            <a:fillRect/>
+          </a:stretch>
+        </p:blipFill>
+        <p:spPr bwMode="auto">
+          <a:xfrm>
+            <a:off x="0" y="1143000"/>
+            <a:ext cx="6858000" cy="6858000"/>
+          </a:xfrm>
+          <a:prstGeom prst="rect">
+            <a:avLst/>
+          </a:prstGeom>
+          <a:noFill/>
+          <a:extLst>
+            <a:ext uri="{909E8E84-426E-40DD-AFC4-6F175D3DCCD1}">
+              <a14:hiddenFill xmlns:a14="http://schemas.microsoft.com/office/drawing/2010/main">
+                <a:solidFill>
+                  <a:srgbClr val="FFFFFF"/>
+                </a:solidFill>
+              </a14:hiddenFill>
+            </a:ext>
+          </a:extLst>
+        </p:spPr>
+      </p:pic>
+      <p:sp>
+        <p:nvSpPr>
+          <p:cNvPr id="4" name="Rectangle 3"/>
+          <p:cNvSpPr/>
+          <p:nvPr/>
+        </p:nvSpPr>
+        <p:spPr>
+          <a:xfrm>
+            <a:off x="2818819" y="3787170"/>
+            <a:ext cx="1220362" cy="1569660"/>
+          </a:xfrm>
+          <a:prstGeom prst="rect">
+            <a:avLst/>
+          </a:prstGeom>
+          <a:noFill/>
+        </p:spPr>
+        <p:txBody>
+          <a:bodyPr wrap="square" lIns="91440" tIns="45720" rIns="91440" bIns="45720">
+            <a:spAutoFit/>
+          </a:bodyPr>
+          <a:lstStyle/>
+          <a:p>
+            <a:pPr algn="ctr"/>
+            <a:r>
+              <a:rPr lang="en-US" sz="9600" b="1" cap="none" spc="0" dirty="0" smtClean="0">
+                <a:ln w="12700">
+                  <a:solidFill>
+                    <a:schemeClr val="tx2">
+                      <a:satMod val="155000"/>
+                    </a:schemeClr>
+                  </a:solidFill>
+                  <a:prstDash val="solid"/>
+                </a:ln>
+                <a:solidFill>
+                  <a:schemeClr val="bg2">
+                    <a:tint val="85000"/>
+                    <a:satMod val="155000"/>
+                  </a:schemeClr>
+                </a:solidFill>
+                <a:effectLst>
+                  <a:outerShdw blurRad="41275" dist="20320" dir="1800000" algn="tl" rotWithShape="0">
+                    <a:srgbClr val="000000">
+                      <a:alpha val="40000"/>
+                    </a:srgbClr>
+                  </a:outerShdw>
+                </a:effectLst>
+              </a:rPr>
+              <a:t>8</a:t>
+            </a:r>
+            <a:endParaRPr lang="en-US" sz="9600" b="1" cap="none" spc="0" dirty="0">
+              <a:ln w="12700">
+                <a:solidFill>
+                  <a:schemeClr val="tx2">
+                    <a:satMod val="155000"/>
+                  </a:schemeClr>
+                </a:solidFill>
+                <a:prstDash val="solid"/>
+              </a:ln>
+              <a:solidFill>
+                <a:schemeClr val="bg2">
+                  <a:tint val="85000"/>
+                  <a:satMod val="155000"/>
+                </a:schemeClr>
+              </a:solidFill>
+              <a:effectLst>
+                <a:outerShdw blurRad="41275" dist="20320" dir="1800000" algn="tl" rotWithShape="0">
+                  <a:srgbClr val="000000">
+                    <a:alpha val="40000"/>
+                  </a:srgbClr>
+                </a:outerShdw>
+              </a:effectLst>
+            </a:endParaRPr>
+          </a:p>
+        </p:txBody>
+      </p:sp>
+      <p:sp>
+        <p:nvSpPr>
+          <p:cNvPr id="5" name="Isosceles Triangle 4"/>
+          <p:cNvSpPr/>
+          <p:nvPr/>
+        </p:nvSpPr>
+        <p:spPr>
+          <a:xfrm>
+            <a:off x="3028950" y="0"/>
+            <a:ext cx="800100" cy="190500"/>
+          </a:xfrm>
+          <a:prstGeom prst="triangle">
+            <a:avLst/>
+          </a:prstGeom>
+        </p:spPr>
+        <p:style>
+          <a:lnRef idx="2">
+            <a:schemeClr val="accent1">
+              <a:shade val="50000"/>
+            </a:schemeClr>
+          </a:lnRef>
+          <a:fillRef idx="1">
+            <a:schemeClr val="accent1"/>
+          </a:fillRef>
+          <a:effectRef idx="0">
+            <a:schemeClr val="accent1"/>
+          </a:effectRef>
+          <a:fontRef idx="minor">
+            <a:schemeClr val="lt1"/>
+          </a:fontRef>
+        </p:style>
+        <p:txBody>
+          <a:bodyPr rtlCol="0" anchor="ctr"/>
+          <a:lstStyle/>
+          <a:p>
+            <a:pPr algn="ctr"/>
+            <a:endParaRPr lang="en-US"/>
+          </a:p>
+        </p:txBody>
+      </p:sp>
+    </p:spTree>
+    <p:extLst>
+      <p:ext uri="{BB962C8B-B14F-4D97-AF65-F5344CB8AC3E}">
+        <p14:creationId xmlns:p14="http://schemas.microsoft.com/office/powerpoint/2010/main" val="1139947112"/>
+      </p:ext>
+    </p:extLst>
   </p:cSld>
   <p:clrMapOvr>
     <a:masterClrMapping/>
@@ -3324,6 +6149,7 @@
         <a:font script="Mong" typeface="Mongolian Baiti"/>
         <a:font script="Viet" typeface="Times New Roman"/>
         <a:font script="Uigh" typeface="Microsoft Uighur"/>
+        <a:font script="Geor" typeface="Sylfaen"/>
       </a:majorFont>
       <a:minorFont>
         <a:latin typeface="Calibri"/>
@@ -3358,6 +6184,7 @@
         <a:font script="Mong" typeface="Mongolian Baiti"/>
         <a:font script="Viet" typeface="Arial"/>
         <a:font script="Uigh" typeface="Microsoft Uighur"/>
+        <a:font script="Geor" typeface="Sylfaen"/>
       </a:minorFont>
     </a:fontScheme>
     <a:fmtScheme name="Office">

</xml_diff>